<commit_message>
Draft Text for sections 1 and 3, Updated Timeline Slide
</commit_message>
<xml_diff>
--- a/timeline.pptx
+++ b/timeline.pptx
@@ -109,6 +109,11 @@
       </a:defRPr>
     </a:lvl9pPr>
   </p:defaultTextStyle>
+  <p:extLst>
+    <p:ext uri="{EFAFB233-063F-42B5-8137-9DF3F51BA10A}">
+      <p15:sldGuideLst xmlns:p15="http://schemas.microsoft.com/office/powerpoint/2012/main"/>
+    </p:ext>
+  </p:extLst>
 </p:presentation>
 </file>
 
@@ -194,7 +199,7 @@
           <a:p>
             <a:fld id="{89C9E0B4-18B5-4B6A-9B26-9BCA3E5896D0}" type="datetimeFigureOut">
               <a:rPr lang="en-US" smtClean="0"/>
-              <a:t>7/24/2020</a:t>
+              <a:t>7/29/2020</a:t>
             </a:fld>
             <a:endParaRPr lang="en-US"/>
           </a:p>
@@ -1010,7 +1015,7 @@
           <a:p>
             <a:fld id="{72EA7947-E287-4738-8C82-07CE4F01EF03}" type="datetime2">
               <a:rPr lang="en-US" smtClean="0"/>
-              <a:t>Friday, July 24, 2020</a:t>
+              <a:t>Wednesday, July 29, 2020</a:t>
             </a:fld>
             <a:endParaRPr lang="en-US" dirty="0"/>
           </a:p>
@@ -2046,7 +2051,7 @@
           <a:p>
             <a:fld id="{EE2EBD84-71F4-4271-8C46-0D47C0A9B12E}" type="datetime2">
               <a:rPr lang="en-US" smtClean="0"/>
-              <a:t>Friday, July 24, 2020</a:t>
+              <a:t>Wednesday, July 29, 2020</a:t>
             </a:fld>
             <a:endParaRPr lang="en-US"/>
           </a:p>
@@ -2257,7 +2262,7 @@
           <a:p>
             <a:fld id="{ABAE0CE1-F450-4107-B2CB-17B18F8A3F4A}" type="datetime2">
               <a:rPr lang="en-US" smtClean="0"/>
-              <a:t>Friday, July 24, 2020</a:t>
+              <a:t>Wednesday, July 29, 2020</a:t>
             </a:fld>
             <a:endParaRPr lang="en-US"/>
           </a:p>
@@ -2922,7 +2927,7 @@
           <a:p>
             <a:fld id="{6FE8C025-CD7A-4966-867E-81CF82B15267}" type="datetime2">
               <a:rPr lang="en-US" smtClean="0"/>
-              <a:t>Friday, July 24, 2020</a:t>
+              <a:t>Wednesday, July 29, 2020</a:t>
             </a:fld>
             <a:endParaRPr lang="en-US"/>
           </a:p>
@@ -3542,7 +3547,7 @@
           <a:p>
             <a:fld id="{FE809929-0719-4517-94D6-FDF7F99E70F6}" type="datetime2">
               <a:rPr lang="en-US" smtClean="0"/>
-              <a:t>Friday, July 24, 2020</a:t>
+              <a:t>Wednesday, July 29, 2020</a:t>
             </a:fld>
             <a:endParaRPr lang="en-US"/>
           </a:p>
@@ -4660,7 +4665,7 @@
           <a:p>
             <a:fld id="{20E95673-5512-4AAA-9AEB-E00C61EC65D5}" type="datetime2">
               <a:rPr lang="en-US" smtClean="0"/>
-              <a:t>Friday, July 24, 2020</a:t>
+              <a:t>Wednesday, July 29, 2020</a:t>
             </a:fld>
             <a:endParaRPr lang="en-US"/>
           </a:p>
@@ -5207,7 +5212,7 @@
           <a:p>
             <a:fld id="{C13138FA-2E87-4873-8BBA-13E447C9A99A}" type="datetime2">
               <a:rPr lang="en-US" smtClean="0"/>
-              <a:t>Friday, July 24, 2020</a:t>
+              <a:t>Wednesday, July 29, 2020</a:t>
             </a:fld>
             <a:endParaRPr lang="en-US"/>
           </a:p>
@@ -5368,7 +5373,7 @@
           <a:p>
             <a:fld id="{D75BB40A-97BD-4BFB-B639-0BFF95FDE8B7}" type="datetime2">
               <a:rPr lang="en-US" smtClean="0"/>
-              <a:t>Friday, July 24, 2020</a:t>
+              <a:t>Wednesday, July 29, 2020</a:t>
             </a:fld>
             <a:endParaRPr lang="en-US"/>
           </a:p>
@@ -6403,7 +6408,7 @@
           <a:p>
             <a:fld id="{9EE9E0E3-ECF6-4CFE-8698-AEFEBCECC3C0}" type="datetime2">
               <a:rPr lang="en-US" smtClean="0"/>
-              <a:t>Friday, July 24, 2020</a:t>
+              <a:t>Wednesday, July 29, 2020</a:t>
             </a:fld>
             <a:endParaRPr lang="en-US"/>
           </a:p>
@@ -7049,7 +7054,7 @@
           <a:p>
             <a:fld id="{251462FC-960E-4740-921F-B36862979F21}" type="datetime2">
               <a:rPr lang="en-US" smtClean="0"/>
-              <a:t>Friday, July 24, 2020</a:t>
+              <a:t>Wednesday, July 29, 2020</a:t>
             </a:fld>
             <a:endParaRPr lang="en-US"/>
           </a:p>
@@ -7813,7 +7818,7 @@
           <a:p>
             <a:fld id="{E50BC9E2-CB44-4C05-9BB5-496C18A241E0}" type="datetime2">
               <a:rPr lang="en-US" smtClean="0"/>
-              <a:t>Friday, July 24, 2020</a:t>
+              <a:t>Wednesday, July 29, 2020</a:t>
             </a:fld>
             <a:endParaRPr lang="en-US"/>
           </a:p>
@@ -8066,7 +8071,7 @@
           <a:p>
             <a:fld id="{246CB39B-5F4C-4A7E-9BE3-AAFD45576D16}" type="datetime2">
               <a:rPr lang="en-US" smtClean="0"/>
-              <a:t>Friday, July 24, 2020</a:t>
+              <a:t>Wednesday, July 29, 2020</a:t>
             </a:fld>
             <a:endParaRPr lang="en-US" dirty="0"/>
           </a:p>
@@ -9353,46 +9358,10 @@
       </p:grpSpPr>
       <p:sp>
         <p:nvSpPr>
-          <p:cNvPr id="2" name="Title 1">
+          <p:cNvPr id="63" name="Rectangle: Rounded Corners 62">
             <a:extLst>
               <a:ext uri="{FF2B5EF4-FFF2-40B4-BE49-F238E27FC236}">
-                <a16:creationId xmlns:a16="http://schemas.microsoft.com/office/drawing/2014/main" id="{C14CCB91-8A4F-4C4A-A272-9995EE0F20EC}"/>
-              </a:ext>
-            </a:extLst>
-          </p:cNvPr>
-          <p:cNvSpPr>
-            <a:spLocks noGrp="1"/>
-          </p:cNvSpPr>
-          <p:nvPr>
-            <p:ph type="title"/>
-          </p:nvPr>
-        </p:nvSpPr>
-        <p:spPr>
-          <a:xfrm>
-            <a:off x="550862" y="123825"/>
-            <a:ext cx="11091600" cy="1104900"/>
-          </a:xfrm>
-        </p:spPr>
-        <p:txBody>
-          <a:bodyPr>
-            <a:normAutofit/>
-          </a:bodyPr>
-          <a:lstStyle/>
-          <a:p>
-            <a:pPr algn="ctr"/>
-            <a:r>
-              <a:rPr lang="en-US" dirty="0"/>
-              <a:t>Timeline of Artificial Intelligence (AI)</a:t>
-            </a:r>
-          </a:p>
-        </p:txBody>
-      </p:sp>
-      <p:sp>
-        <p:nvSpPr>
-          <p:cNvPr id="4" name="Rectangle: Rounded Corners 3">
-            <a:extLst>
-              <a:ext uri="{FF2B5EF4-FFF2-40B4-BE49-F238E27FC236}">
-                <a16:creationId xmlns:a16="http://schemas.microsoft.com/office/drawing/2014/main" id="{3BC8CD69-9664-4273-87C7-7FD963972956}"/>
+                <a16:creationId xmlns:a16="http://schemas.microsoft.com/office/drawing/2014/main" id="{BF955FB2-712E-4D9C-8C1F-2F486E663127}"/>
               </a:ext>
             </a:extLst>
           </p:cNvPr>
@@ -9401,567 +9370,8 @@
         </p:nvSpPr>
         <p:spPr>
           <a:xfrm>
-            <a:off x="809353" y="4349318"/>
-            <a:ext cx="1260630" cy="1642369"/>
-          </a:xfrm>
-          <a:prstGeom prst="roundRect">
-            <a:avLst/>
-          </a:prstGeom>
-          <a:effectLst>
-            <a:outerShdw blurRad="50800" dist="38100" dir="5400000" algn="t" rotWithShape="0">
-              <a:prstClr val="black">
-                <a:alpha val="40000"/>
-              </a:prstClr>
-            </a:outerShdw>
-          </a:effectLst>
-          <a:scene3d>
-            <a:camera prst="orthographicFront"/>
-            <a:lightRig rig="threePt" dir="t"/>
-          </a:scene3d>
-          <a:sp3d>
-            <a:bevelT/>
-          </a:sp3d>
-        </p:spPr>
-        <p:style>
-          <a:lnRef idx="2">
-            <a:schemeClr val="accent1">
-              <a:shade val="50000"/>
-            </a:schemeClr>
-          </a:lnRef>
-          <a:fillRef idx="1">
-            <a:schemeClr val="accent1"/>
-          </a:fillRef>
-          <a:effectRef idx="0">
-            <a:schemeClr val="accent1"/>
-          </a:effectRef>
-          <a:fontRef idx="minor">
-            <a:schemeClr val="lt1"/>
-          </a:fontRef>
-        </p:style>
-        <p:txBody>
-          <a:bodyPr rtlCol="0" anchor="ctr">
-            <a:normAutofit fontScale="92500" lnSpcReduction="10000"/>
-          </a:bodyPr>
-          <a:lstStyle/>
-          <a:p>
-            <a:pPr algn="ctr"/>
-            <a:r>
-              <a:rPr lang="en-US" sz="1400" dirty="0">
-                <a:effectLst>
-                  <a:outerShdw blurRad="38100" dist="38100" dir="2700000" algn="tl">
-                    <a:srgbClr val="000000">
-                      <a:alpha val="43137"/>
-                    </a:srgbClr>
-                  </a:outerShdw>
-                </a:effectLst>
-              </a:rPr>
-              <a:t>Parallel Distributed Processing published, advancing neural network models</a:t>
-            </a:r>
-          </a:p>
-        </p:txBody>
-      </p:sp>
-      <p:sp>
-        <p:nvSpPr>
-          <p:cNvPr id="8" name="Rectangle: Rounded Corners 7">
-            <a:extLst>
-              <a:ext uri="{FF2B5EF4-FFF2-40B4-BE49-F238E27FC236}">
-                <a16:creationId xmlns:a16="http://schemas.microsoft.com/office/drawing/2014/main" id="{DCF959EA-9F1E-4369-88A6-E8074AEA0289}"/>
-              </a:ext>
-            </a:extLst>
-          </p:cNvPr>
-          <p:cNvSpPr/>
-          <p:nvPr/>
-        </p:nvSpPr>
-        <p:spPr>
-          <a:xfrm>
-            <a:off x="2361464" y="4349318"/>
-            <a:ext cx="1260630" cy="1642369"/>
-          </a:xfrm>
-          <a:prstGeom prst="roundRect">
-            <a:avLst/>
-          </a:prstGeom>
-          <a:effectLst>
-            <a:outerShdw blurRad="50800" dist="38100" dir="5400000" algn="t" rotWithShape="0">
-              <a:prstClr val="black">
-                <a:alpha val="40000"/>
-              </a:prstClr>
-            </a:outerShdw>
-          </a:effectLst>
-          <a:scene3d>
-            <a:camera prst="orthographicFront"/>
-            <a:lightRig rig="threePt" dir="t"/>
-          </a:scene3d>
-          <a:sp3d>
-            <a:bevelT/>
-          </a:sp3d>
-        </p:spPr>
-        <p:style>
-          <a:lnRef idx="2">
-            <a:schemeClr val="accent1">
-              <a:shade val="50000"/>
-            </a:schemeClr>
-          </a:lnRef>
-          <a:fillRef idx="1">
-            <a:schemeClr val="accent1"/>
-          </a:fillRef>
-          <a:effectRef idx="0">
-            <a:schemeClr val="accent1"/>
-          </a:effectRef>
-          <a:fontRef idx="minor">
-            <a:schemeClr val="lt1"/>
-          </a:fontRef>
-        </p:style>
-        <p:txBody>
-          <a:bodyPr rtlCol="0" anchor="ctr">
-            <a:normAutofit/>
-          </a:bodyPr>
-          <a:lstStyle/>
-          <a:p>
-            <a:pPr algn="ctr"/>
-            <a:r>
-              <a:rPr lang="en-US" sz="1400" dirty="0">
-                <a:effectLst>
-                  <a:outerShdw blurRad="38100" dist="38100" dir="2700000" algn="tl">
-                    <a:srgbClr val="000000">
-                      <a:alpha val="43137"/>
-                    </a:srgbClr>
-                  </a:outerShdw>
-                </a:effectLst>
-              </a:rPr>
-              <a:t>IBM’s Deep Blue defeats world chess champion Kasparov </a:t>
-            </a:r>
-          </a:p>
-        </p:txBody>
-      </p:sp>
-      <p:sp>
-        <p:nvSpPr>
-          <p:cNvPr id="12" name="Rectangle: Rounded Corners 11">
-            <a:extLst>
-              <a:ext uri="{FF2B5EF4-FFF2-40B4-BE49-F238E27FC236}">
-                <a16:creationId xmlns:a16="http://schemas.microsoft.com/office/drawing/2014/main" id="{7A2AC1F5-DA57-4B42-AA9F-372A8D4249D4}"/>
-              </a:ext>
-            </a:extLst>
-          </p:cNvPr>
-          <p:cNvSpPr/>
-          <p:nvPr/>
-        </p:nvSpPr>
-        <p:spPr>
-          <a:xfrm>
-            <a:off x="3913575" y="4349318"/>
-            <a:ext cx="1260630" cy="1642369"/>
-          </a:xfrm>
-          <a:prstGeom prst="roundRect">
-            <a:avLst/>
-          </a:prstGeom>
-          <a:effectLst>
-            <a:outerShdw blurRad="50800" dist="38100" dir="5400000" algn="t" rotWithShape="0">
-              <a:prstClr val="black">
-                <a:alpha val="40000"/>
-              </a:prstClr>
-            </a:outerShdw>
-          </a:effectLst>
-          <a:scene3d>
-            <a:camera prst="orthographicFront"/>
-            <a:lightRig rig="threePt" dir="t"/>
-          </a:scene3d>
-          <a:sp3d>
-            <a:bevelT/>
-          </a:sp3d>
-        </p:spPr>
-        <p:style>
-          <a:lnRef idx="2">
-            <a:schemeClr val="accent1">
-              <a:shade val="50000"/>
-            </a:schemeClr>
-          </a:lnRef>
-          <a:fillRef idx="1">
-            <a:schemeClr val="accent1"/>
-          </a:fillRef>
-          <a:effectRef idx="0">
-            <a:schemeClr val="accent1"/>
-          </a:effectRef>
-          <a:fontRef idx="minor">
-            <a:schemeClr val="lt1"/>
-          </a:fontRef>
-        </p:style>
-        <p:txBody>
-          <a:bodyPr rtlCol="0" anchor="ctr">
-            <a:normAutofit lnSpcReduction="10000"/>
-          </a:bodyPr>
-          <a:lstStyle/>
-          <a:p>
-            <a:pPr algn="ctr"/>
-            <a:r>
-              <a:rPr lang="en-US" sz="1400" dirty="0">
-                <a:effectLst>
-                  <a:outerShdw blurRad="38100" dist="38100" dir="2700000" algn="tl">
-                    <a:srgbClr val="000000">
-                      <a:alpha val="43137"/>
-                    </a:srgbClr>
-                  </a:outerShdw>
-                </a:effectLst>
-              </a:rPr>
-              <a:t>Microsoft Kinect greatly improves motion-sensing input capability</a:t>
-            </a:r>
-          </a:p>
-        </p:txBody>
-      </p:sp>
-      <p:sp>
-        <p:nvSpPr>
-          <p:cNvPr id="16" name="Rectangle: Rounded Corners 15">
-            <a:extLst>
-              <a:ext uri="{FF2B5EF4-FFF2-40B4-BE49-F238E27FC236}">
-                <a16:creationId xmlns:a16="http://schemas.microsoft.com/office/drawing/2014/main" id="{E4788FB9-BF38-481B-8799-A57217A9B43B}"/>
-              </a:ext>
-            </a:extLst>
-          </p:cNvPr>
-          <p:cNvSpPr/>
-          <p:nvPr/>
-        </p:nvSpPr>
-        <p:spPr>
-          <a:xfrm>
-            <a:off x="5465686" y="4349318"/>
-            <a:ext cx="1260630" cy="1642369"/>
-          </a:xfrm>
-          <a:prstGeom prst="roundRect">
-            <a:avLst/>
-          </a:prstGeom>
-          <a:effectLst>
-            <a:outerShdw blurRad="50800" dist="38100" dir="5400000" algn="t" rotWithShape="0">
-              <a:prstClr val="black">
-                <a:alpha val="40000"/>
-              </a:prstClr>
-            </a:outerShdw>
-          </a:effectLst>
-          <a:scene3d>
-            <a:camera prst="orthographicFront"/>
-            <a:lightRig rig="threePt" dir="t"/>
-          </a:scene3d>
-          <a:sp3d>
-            <a:bevelT/>
-          </a:sp3d>
-        </p:spPr>
-        <p:style>
-          <a:lnRef idx="2">
-            <a:schemeClr val="accent1">
-              <a:shade val="50000"/>
-            </a:schemeClr>
-          </a:lnRef>
-          <a:fillRef idx="1">
-            <a:schemeClr val="accent1"/>
-          </a:fillRef>
-          <a:effectRef idx="0">
-            <a:schemeClr val="accent1"/>
-          </a:effectRef>
-          <a:fontRef idx="minor">
-            <a:schemeClr val="lt1"/>
-          </a:fontRef>
-        </p:style>
-        <p:txBody>
-          <a:bodyPr rtlCol="0" anchor="ctr">
-            <a:normAutofit/>
-          </a:bodyPr>
-          <a:lstStyle/>
-          <a:p>
-            <a:pPr algn="ctr"/>
-            <a:r>
-              <a:rPr lang="en-US" sz="1400" dirty="0">
-                <a:effectLst>
-                  <a:outerShdw blurRad="38100" dist="38100" dir="2700000" algn="tl">
-                    <a:srgbClr val="000000">
-                      <a:alpha val="43137"/>
-                    </a:srgbClr>
-                  </a:outerShdw>
-                </a:effectLst>
-              </a:rPr>
-              <a:t>Google Brain deep neural network can discover and categorize items</a:t>
-            </a:r>
-          </a:p>
-        </p:txBody>
-      </p:sp>
-      <p:sp>
-        <p:nvSpPr>
-          <p:cNvPr id="20" name="Rectangle: Rounded Corners 19">
-            <a:extLst>
-              <a:ext uri="{FF2B5EF4-FFF2-40B4-BE49-F238E27FC236}">
-                <a16:creationId xmlns:a16="http://schemas.microsoft.com/office/drawing/2014/main" id="{5E9D9206-0166-420F-9F7C-4FC9EFA04F22}"/>
-              </a:ext>
-            </a:extLst>
-          </p:cNvPr>
-          <p:cNvSpPr/>
-          <p:nvPr/>
-        </p:nvSpPr>
-        <p:spPr>
-          <a:xfrm>
-            <a:off x="7017797" y="4349318"/>
-            <a:ext cx="1260630" cy="1642369"/>
-          </a:xfrm>
-          <a:prstGeom prst="roundRect">
-            <a:avLst/>
-          </a:prstGeom>
-          <a:effectLst>
-            <a:outerShdw blurRad="50800" dist="38100" dir="5400000" algn="t" rotWithShape="0">
-              <a:prstClr val="black">
-                <a:alpha val="40000"/>
-              </a:prstClr>
-            </a:outerShdw>
-          </a:effectLst>
-          <a:scene3d>
-            <a:camera prst="orthographicFront"/>
-            <a:lightRig rig="threePt" dir="t"/>
-          </a:scene3d>
-          <a:sp3d>
-            <a:bevelT/>
-          </a:sp3d>
-        </p:spPr>
-        <p:style>
-          <a:lnRef idx="2">
-            <a:schemeClr val="accent1">
-              <a:shade val="50000"/>
-            </a:schemeClr>
-          </a:lnRef>
-          <a:fillRef idx="1">
-            <a:schemeClr val="accent1"/>
-          </a:fillRef>
-          <a:effectRef idx="0">
-            <a:schemeClr val="accent1"/>
-          </a:effectRef>
-          <a:fontRef idx="minor">
-            <a:schemeClr val="lt1"/>
-          </a:fontRef>
-        </p:style>
-        <p:txBody>
-          <a:bodyPr rtlCol="0" anchor="ctr">
-            <a:normAutofit lnSpcReduction="10000"/>
-          </a:bodyPr>
-          <a:lstStyle/>
-          <a:p>
-            <a:pPr algn="ctr"/>
-            <a:r>
-              <a:rPr lang="en-US" sz="1400" dirty="0">
-                <a:effectLst>
-                  <a:outerShdw blurRad="38100" dist="38100" dir="2700000" algn="tl">
-                    <a:srgbClr val="000000">
-                      <a:alpha val="43137"/>
-                    </a:srgbClr>
-                  </a:outerShdw>
-                </a:effectLst>
-              </a:rPr>
-              <a:t>Facebook develops </a:t>
-            </a:r>
-            <a:r>
-              <a:rPr lang="en-US" sz="1400" dirty="0" err="1">
-                <a:effectLst>
-                  <a:outerShdw blurRad="38100" dist="38100" dir="2700000" algn="tl">
-                    <a:srgbClr val="000000">
-                      <a:alpha val="43137"/>
-                    </a:srgbClr>
-                  </a:outerShdw>
-                </a:effectLst>
-              </a:rPr>
-              <a:t>DeepFace</a:t>
-            </a:r>
-            <a:r>
-              <a:rPr lang="en-US" sz="1400" dirty="0">
-                <a:effectLst>
-                  <a:outerShdw blurRad="38100" dist="38100" dir="2700000" algn="tl">
-                    <a:srgbClr val="000000">
-                      <a:alpha val="43137"/>
-                    </a:srgbClr>
-                  </a:outerShdw>
-                </a:effectLst>
-              </a:rPr>
-              <a:t>, greatly improving human facial recognition</a:t>
-            </a:r>
-          </a:p>
-        </p:txBody>
-      </p:sp>
-      <p:sp>
-        <p:nvSpPr>
-          <p:cNvPr id="24" name="Rectangle: Rounded Corners 23">
-            <a:extLst>
-              <a:ext uri="{FF2B5EF4-FFF2-40B4-BE49-F238E27FC236}">
-                <a16:creationId xmlns:a16="http://schemas.microsoft.com/office/drawing/2014/main" id="{131D61DA-111E-4B7A-B808-E81D7F38916A}"/>
-              </a:ext>
-            </a:extLst>
-          </p:cNvPr>
-          <p:cNvSpPr/>
-          <p:nvPr/>
-        </p:nvSpPr>
-        <p:spPr>
-          <a:xfrm>
-            <a:off x="8569908" y="4349318"/>
-            <a:ext cx="1260630" cy="1642369"/>
-          </a:xfrm>
-          <a:prstGeom prst="roundRect">
-            <a:avLst/>
-          </a:prstGeom>
-          <a:effectLst>
-            <a:outerShdw blurRad="50800" dist="38100" dir="5400000" algn="t" rotWithShape="0">
-              <a:prstClr val="black">
-                <a:alpha val="40000"/>
-              </a:prstClr>
-            </a:outerShdw>
-          </a:effectLst>
-          <a:scene3d>
-            <a:camera prst="orthographicFront"/>
-            <a:lightRig rig="threePt" dir="t"/>
-          </a:scene3d>
-          <a:sp3d>
-            <a:bevelT/>
-          </a:sp3d>
-        </p:spPr>
-        <p:style>
-          <a:lnRef idx="2">
-            <a:schemeClr val="accent1">
-              <a:shade val="50000"/>
-            </a:schemeClr>
-          </a:lnRef>
-          <a:fillRef idx="1">
-            <a:schemeClr val="accent1"/>
-          </a:fillRef>
-          <a:effectRef idx="0">
-            <a:schemeClr val="accent1"/>
-          </a:effectRef>
-          <a:fontRef idx="minor">
-            <a:schemeClr val="lt1"/>
-          </a:fontRef>
-        </p:style>
-        <p:txBody>
-          <a:bodyPr rtlCol="0" anchor="ctr">
-            <a:normAutofit fontScale="92500" lnSpcReduction="20000"/>
-          </a:bodyPr>
-          <a:lstStyle/>
-          <a:p>
-            <a:pPr algn="ctr"/>
-            <a:r>
-              <a:rPr lang="en-US" sz="1400" dirty="0">
-                <a:effectLst>
-                  <a:outerShdw blurRad="38100" dist="38100" dir="2700000" algn="tl">
-                    <a:srgbClr val="000000">
-                      <a:alpha val="43137"/>
-                    </a:srgbClr>
-                  </a:outerShdw>
-                </a:effectLst>
-              </a:rPr>
-              <a:t>Microsoft’s Distributed Machine Learning Toolkit improves distribution across systems</a:t>
-            </a:r>
-          </a:p>
-        </p:txBody>
-      </p:sp>
-      <p:sp>
-        <p:nvSpPr>
-          <p:cNvPr id="28" name="Rectangle: Rounded Corners 27">
-            <a:extLst>
-              <a:ext uri="{FF2B5EF4-FFF2-40B4-BE49-F238E27FC236}">
-                <a16:creationId xmlns:a16="http://schemas.microsoft.com/office/drawing/2014/main" id="{19EB4C5F-37AF-4DC2-99A0-5251C5D4281E}"/>
-              </a:ext>
-            </a:extLst>
-          </p:cNvPr>
-          <p:cNvSpPr/>
-          <p:nvPr/>
-        </p:nvSpPr>
-        <p:spPr>
-          <a:xfrm>
-            <a:off x="10122017" y="4349318"/>
-            <a:ext cx="1260630" cy="1642369"/>
-          </a:xfrm>
-          <a:prstGeom prst="roundRect">
-            <a:avLst/>
-          </a:prstGeom>
-          <a:effectLst>
-            <a:outerShdw blurRad="50800" dist="38100" dir="5400000" algn="t" rotWithShape="0">
-              <a:prstClr val="black">
-                <a:alpha val="40000"/>
-              </a:prstClr>
-            </a:outerShdw>
-          </a:effectLst>
-          <a:scene3d>
-            <a:camera prst="orthographicFront"/>
-            <a:lightRig rig="threePt" dir="t"/>
-          </a:scene3d>
-          <a:sp3d>
-            <a:bevelT/>
-          </a:sp3d>
-        </p:spPr>
-        <p:style>
-          <a:lnRef idx="2">
-            <a:schemeClr val="accent1">
-              <a:shade val="50000"/>
-            </a:schemeClr>
-          </a:lnRef>
-          <a:fillRef idx="1">
-            <a:schemeClr val="accent1"/>
-          </a:fillRef>
-          <a:effectRef idx="0">
-            <a:schemeClr val="accent1"/>
-          </a:effectRef>
-          <a:fontRef idx="minor">
-            <a:schemeClr val="lt1"/>
-          </a:fontRef>
-        </p:style>
-        <p:txBody>
-          <a:bodyPr rtlCol="0" anchor="ctr">
-            <a:normAutofit fontScale="92500" lnSpcReduction="20000"/>
-          </a:bodyPr>
-          <a:lstStyle/>
-          <a:p>
-            <a:pPr algn="ctr"/>
-            <a:r>
-              <a:rPr lang="en-US" sz="1400" dirty="0">
-                <a:effectLst>
-                  <a:outerShdw blurRad="38100" dist="38100" dir="2700000" algn="tl">
-                    <a:srgbClr val="000000">
-                      <a:alpha val="43137"/>
-                    </a:srgbClr>
-                  </a:outerShdw>
-                </a:effectLst>
-              </a:rPr>
-              <a:t>Carnegie Mellon and University of Alberta create systems to defeat top Texas Hold ‘</a:t>
-            </a:r>
-            <a:r>
-              <a:rPr lang="en-US" sz="1400" dirty="0" err="1">
-                <a:effectLst>
-                  <a:outerShdw blurRad="38100" dist="38100" dir="2700000" algn="tl">
-                    <a:srgbClr val="000000">
-                      <a:alpha val="43137"/>
-                    </a:srgbClr>
-                  </a:outerShdw>
-                </a:effectLst>
-              </a:rPr>
-              <a:t>em</a:t>
-            </a:r>
-            <a:r>
-              <a:rPr lang="en-US" sz="1400" dirty="0">
-                <a:effectLst>
-                  <a:outerShdw blurRad="38100" dist="38100" dir="2700000" algn="tl">
-                    <a:srgbClr val="000000">
-                      <a:alpha val="43137"/>
-                    </a:srgbClr>
-                  </a:outerShdw>
-                </a:effectLst>
-              </a:rPr>
-              <a:t> players</a:t>
-            </a:r>
-          </a:p>
-        </p:txBody>
-      </p:sp>
-      <p:sp>
-        <p:nvSpPr>
-          <p:cNvPr id="32" name="Rectangle: Rounded Corners 31">
-            <a:extLst>
-              <a:ext uri="{FF2B5EF4-FFF2-40B4-BE49-F238E27FC236}">
-                <a16:creationId xmlns:a16="http://schemas.microsoft.com/office/drawing/2014/main" id="{9A303D87-60A9-47DC-B5C6-8E4BB3098011}"/>
-              </a:ext>
-            </a:extLst>
-          </p:cNvPr>
-          <p:cNvSpPr/>
-          <p:nvPr/>
-        </p:nvSpPr>
-        <p:spPr>
-          <a:xfrm>
-            <a:off x="809353" y="3950083"/>
-            <a:ext cx="1260630" cy="341913"/>
+            <a:off x="1524000" y="5825765"/>
+            <a:ext cx="9144000" cy="902360"/>
           </a:xfrm>
           <a:prstGeom prst="roundRect">
             <a:avLst/>
@@ -9998,7 +9408,7 @@
           </a:fontRef>
         </p:style>
         <p:txBody>
-          <a:bodyPr rtlCol="0" anchor="ctr">
+          <a:bodyPr rtlCol="0" anchor="t" anchorCtr="0">
             <a:noAutofit/>
           </a:bodyPr>
           <a:lstStyle/>
@@ -10014,71 +9424,1019 @@
                   </a:outerShdw>
                 </a:effectLst>
               </a:rPr>
-              <a:t>1986:</a:t>
+              <a:t>Legend:</a:t>
             </a:r>
           </a:p>
         </p:txBody>
       </p:sp>
       <p:sp>
         <p:nvSpPr>
-          <p:cNvPr id="34" name="Rectangle: Rounded Corners 33">
+          <p:cNvPr id="2" name="Title 1">
             <a:extLst>
               <a:ext uri="{FF2B5EF4-FFF2-40B4-BE49-F238E27FC236}">
-                <a16:creationId xmlns:a16="http://schemas.microsoft.com/office/drawing/2014/main" id="{7D9C3FFB-E3FC-4D62-8221-2D04CBD6A4B9}"/>
+                <a16:creationId xmlns:a16="http://schemas.microsoft.com/office/drawing/2014/main" id="{C14CCB91-8A4F-4C4A-A272-9995EE0F20EC}"/>
               </a:ext>
             </a:extLst>
           </p:cNvPr>
-          <p:cNvSpPr/>
-          <p:nvPr/>
+          <p:cNvSpPr>
+            <a:spLocks noGrp="1"/>
+          </p:cNvSpPr>
+          <p:nvPr>
+            <p:ph type="title"/>
+          </p:nvPr>
         </p:nvSpPr>
         <p:spPr>
           <a:xfrm>
-            <a:off x="2361464" y="3950083"/>
-            <a:ext cx="1260630" cy="341913"/>
+            <a:off x="550862" y="123825"/>
+            <a:ext cx="11091600" cy="1104900"/>
           </a:xfrm>
-          <a:prstGeom prst="roundRect">
-            <a:avLst/>
-          </a:prstGeom>
-          <a:effectLst>
-            <a:outerShdw blurRad="50800" dist="38100" dir="5400000" algn="t" rotWithShape="0">
-              <a:prstClr val="black">
-                <a:alpha val="40000"/>
-              </a:prstClr>
-            </a:outerShdw>
-          </a:effectLst>
-          <a:scene3d>
-            <a:camera prst="orthographicFront"/>
-            <a:lightRig rig="threePt" dir="t"/>
-          </a:scene3d>
-          <a:sp3d>
-            <a:bevelT/>
-          </a:sp3d>
         </p:spPr>
-        <p:style>
-          <a:lnRef idx="2">
-            <a:schemeClr val="accent3">
-              <a:shade val="50000"/>
-            </a:schemeClr>
-          </a:lnRef>
-          <a:fillRef idx="1">
-            <a:schemeClr val="accent3"/>
-          </a:fillRef>
-          <a:effectRef idx="0">
-            <a:schemeClr val="accent3"/>
-          </a:effectRef>
-          <a:fontRef idx="minor">
-            <a:schemeClr val="lt1"/>
-          </a:fontRef>
-        </p:style>
         <p:txBody>
-          <a:bodyPr rtlCol="0" anchor="ctr">
-            <a:noAutofit/>
+          <a:bodyPr>
+            <a:normAutofit/>
           </a:bodyPr>
           <a:lstStyle/>
           <a:p>
             <a:pPr algn="ctr"/>
             <a:r>
-              <a:rPr lang="en-US" sz="1600" dirty="0">
+              <a:rPr lang="en-US" dirty="0"/>
+              <a:t>Timeline of Artificial Intelligence (AI)</a:t>
+            </a:r>
+          </a:p>
+        </p:txBody>
+      </p:sp>
+      <p:grpSp>
+        <p:nvGrpSpPr>
+          <p:cNvPr id="68" name="Group 67">
+            <a:extLst>
+              <a:ext uri="{FF2B5EF4-FFF2-40B4-BE49-F238E27FC236}">
+                <a16:creationId xmlns:a16="http://schemas.microsoft.com/office/drawing/2014/main" id="{D1D9FF0B-562C-445C-B3B3-B79B62FFCC6F}"/>
+              </a:ext>
+            </a:extLst>
+          </p:cNvPr>
+          <p:cNvGrpSpPr/>
+          <p:nvPr/>
+        </p:nvGrpSpPr>
+        <p:grpSpPr>
+          <a:xfrm>
+            <a:off x="318189" y="3682120"/>
+            <a:ext cx="11551278" cy="1406355"/>
+            <a:chOff x="277406" y="3465303"/>
+            <a:chExt cx="11551278" cy="1406355"/>
+          </a:xfrm>
+        </p:grpSpPr>
+        <p:sp>
+          <p:nvSpPr>
+            <p:cNvPr id="4" name="Rectangle: Rounded Corners 3">
+              <a:extLst>
+                <a:ext uri="{FF2B5EF4-FFF2-40B4-BE49-F238E27FC236}">
+                  <a16:creationId xmlns:a16="http://schemas.microsoft.com/office/drawing/2014/main" id="{3BC8CD69-9664-4273-87C7-7FD963972956}"/>
+                </a:ext>
+              </a:extLst>
+            </p:cNvPr>
+            <p:cNvSpPr/>
+            <p:nvPr/>
+          </p:nvSpPr>
+          <p:spPr>
+            <a:xfrm>
+              <a:off x="277406" y="3465303"/>
+              <a:ext cx="1573590" cy="1406355"/>
+            </a:xfrm>
+            <a:prstGeom prst="roundRect">
+              <a:avLst/>
+            </a:prstGeom>
+            <a:solidFill>
+              <a:schemeClr val="bg1">
+                <a:lumMod val="50000"/>
+                <a:lumOff val="50000"/>
+              </a:schemeClr>
+            </a:solidFill>
+            <a:effectLst>
+              <a:outerShdw blurRad="50800" dist="38100" dir="5400000" algn="t" rotWithShape="0">
+                <a:prstClr val="black">
+                  <a:alpha val="40000"/>
+                </a:prstClr>
+              </a:outerShdw>
+            </a:effectLst>
+            <a:scene3d>
+              <a:camera prst="orthographicFront"/>
+              <a:lightRig rig="threePt" dir="t"/>
+            </a:scene3d>
+            <a:sp3d>
+              <a:bevelT/>
+            </a:sp3d>
+          </p:spPr>
+          <p:style>
+            <a:lnRef idx="2">
+              <a:schemeClr val="accent1">
+                <a:shade val="50000"/>
+              </a:schemeClr>
+            </a:lnRef>
+            <a:fillRef idx="1">
+              <a:schemeClr val="accent1"/>
+            </a:fillRef>
+            <a:effectRef idx="0">
+              <a:schemeClr val="accent1"/>
+            </a:effectRef>
+            <a:fontRef idx="minor">
+              <a:schemeClr val="lt1"/>
+            </a:fontRef>
+          </p:style>
+          <p:txBody>
+            <a:bodyPr rtlCol="0" anchor="ctr">
+              <a:normAutofit fontScale="92500" lnSpcReduction="10000"/>
+            </a:bodyPr>
+            <a:lstStyle/>
+            <a:p>
+              <a:pPr algn="ctr"/>
+              <a:r>
+                <a:rPr lang="en-US" sz="1400" dirty="0">
+                  <a:effectLst>
+                    <a:outerShdw blurRad="38100" dist="38100" dir="2700000" algn="tl">
+                      <a:srgbClr val="000000">
+                        <a:alpha val="43137"/>
+                      </a:srgbClr>
+                    </a:outerShdw>
+                  </a:effectLst>
+                </a:rPr>
+                <a:t>Parallel Distributed Processing published, advancing neural network models</a:t>
+              </a:r>
+            </a:p>
+          </p:txBody>
+        </p:sp>
+        <p:sp>
+          <p:nvSpPr>
+            <p:cNvPr id="12" name="Rectangle: Rounded Corners 11">
+              <a:extLst>
+                <a:ext uri="{FF2B5EF4-FFF2-40B4-BE49-F238E27FC236}">
+                  <a16:creationId xmlns:a16="http://schemas.microsoft.com/office/drawing/2014/main" id="{7A2AC1F5-DA57-4B42-AA9F-372A8D4249D4}"/>
+                </a:ext>
+              </a:extLst>
+            </p:cNvPr>
+            <p:cNvSpPr/>
+            <p:nvPr/>
+          </p:nvSpPr>
+          <p:spPr>
+            <a:xfrm>
+              <a:off x="5200682" y="3465303"/>
+              <a:ext cx="1573590" cy="1406355"/>
+            </a:xfrm>
+            <a:prstGeom prst="roundRect">
+              <a:avLst/>
+            </a:prstGeom>
+            <a:solidFill>
+              <a:srgbClr val="00B050"/>
+            </a:solidFill>
+            <a:effectLst>
+              <a:outerShdw blurRad="50800" dist="38100" dir="5400000" algn="t" rotWithShape="0">
+                <a:prstClr val="black">
+                  <a:alpha val="40000"/>
+                </a:prstClr>
+              </a:outerShdw>
+            </a:effectLst>
+            <a:scene3d>
+              <a:camera prst="orthographicFront"/>
+              <a:lightRig rig="threePt" dir="t"/>
+            </a:scene3d>
+            <a:sp3d>
+              <a:bevelT/>
+            </a:sp3d>
+          </p:spPr>
+          <p:style>
+            <a:lnRef idx="2">
+              <a:schemeClr val="accent1">
+                <a:shade val="50000"/>
+              </a:schemeClr>
+            </a:lnRef>
+            <a:fillRef idx="1">
+              <a:schemeClr val="accent1"/>
+            </a:fillRef>
+            <a:effectRef idx="0">
+              <a:schemeClr val="accent1"/>
+            </a:effectRef>
+            <a:fontRef idx="minor">
+              <a:schemeClr val="lt1"/>
+            </a:fontRef>
+          </p:style>
+          <p:txBody>
+            <a:bodyPr rtlCol="0" anchor="ctr">
+              <a:normAutofit/>
+            </a:bodyPr>
+            <a:lstStyle/>
+            <a:p>
+              <a:pPr algn="ctr"/>
+              <a:r>
+                <a:rPr lang="en-US" sz="1400" dirty="0">
+                  <a:effectLst>
+                    <a:outerShdw blurRad="38100" dist="38100" dir="2700000" algn="tl">
+                      <a:srgbClr val="000000">
+                        <a:alpha val="43137"/>
+                      </a:srgbClr>
+                    </a:outerShdw>
+                  </a:effectLst>
+                </a:rPr>
+                <a:t>Microsoft Kinect greatly improves motion-sensing input capability</a:t>
+              </a:r>
+            </a:p>
+          </p:txBody>
+        </p:sp>
+        <p:sp>
+          <p:nvSpPr>
+            <p:cNvPr id="24" name="Rectangle: Rounded Corners 23">
+              <a:extLst>
+                <a:ext uri="{FF2B5EF4-FFF2-40B4-BE49-F238E27FC236}">
+                  <a16:creationId xmlns:a16="http://schemas.microsoft.com/office/drawing/2014/main" id="{131D61DA-111E-4B7A-B808-E81D7F38916A}"/>
+                </a:ext>
+              </a:extLst>
+            </p:cNvPr>
+            <p:cNvSpPr/>
+            <p:nvPr/>
+          </p:nvSpPr>
+          <p:spPr>
+            <a:xfrm>
+              <a:off x="8614002" y="3465303"/>
+              <a:ext cx="1573590" cy="1406355"/>
+            </a:xfrm>
+            <a:prstGeom prst="roundRect">
+              <a:avLst/>
+            </a:prstGeom>
+            <a:solidFill>
+              <a:srgbClr val="00B050"/>
+            </a:solidFill>
+            <a:effectLst>
+              <a:outerShdw blurRad="50800" dist="38100" dir="5400000" algn="t" rotWithShape="0">
+                <a:prstClr val="black">
+                  <a:alpha val="40000"/>
+                </a:prstClr>
+              </a:outerShdw>
+            </a:effectLst>
+            <a:scene3d>
+              <a:camera prst="orthographicFront"/>
+              <a:lightRig rig="threePt" dir="t"/>
+            </a:scene3d>
+            <a:sp3d>
+              <a:bevelT/>
+            </a:sp3d>
+          </p:spPr>
+          <p:style>
+            <a:lnRef idx="2">
+              <a:schemeClr val="accent1">
+                <a:shade val="50000"/>
+              </a:schemeClr>
+            </a:lnRef>
+            <a:fillRef idx="1">
+              <a:schemeClr val="accent1"/>
+            </a:fillRef>
+            <a:effectRef idx="0">
+              <a:schemeClr val="accent1"/>
+            </a:effectRef>
+            <a:fontRef idx="minor">
+              <a:schemeClr val="lt1"/>
+            </a:fontRef>
+          </p:style>
+          <p:txBody>
+            <a:bodyPr rtlCol="0" anchor="ctr">
+              <a:normAutofit fontScale="92500" lnSpcReduction="10000"/>
+            </a:bodyPr>
+            <a:lstStyle/>
+            <a:p>
+              <a:pPr algn="ctr"/>
+              <a:r>
+                <a:rPr lang="en-US" sz="1400" dirty="0">
+                  <a:effectLst>
+                    <a:outerShdw blurRad="38100" dist="38100" dir="2700000" algn="tl">
+                      <a:srgbClr val="000000">
+                        <a:alpha val="43137"/>
+                      </a:srgbClr>
+                    </a:outerShdw>
+                  </a:effectLst>
+                </a:rPr>
+                <a:t>Microsoft’s Distributed Machine Learning Toolkit improves distribution across systems</a:t>
+              </a:r>
+            </a:p>
+          </p:txBody>
+        </p:sp>
+        <p:sp>
+          <p:nvSpPr>
+            <p:cNvPr id="6" name="Rectangle: Rounded Corners 5">
+              <a:extLst>
+                <a:ext uri="{FF2B5EF4-FFF2-40B4-BE49-F238E27FC236}">
+                  <a16:creationId xmlns:a16="http://schemas.microsoft.com/office/drawing/2014/main" id="{4C4C857B-F97E-4B19-8451-973B6FEBFF69}"/>
+                </a:ext>
+              </a:extLst>
+            </p:cNvPr>
+            <p:cNvSpPr/>
+            <p:nvPr/>
+          </p:nvSpPr>
+          <p:spPr>
+            <a:xfrm>
+              <a:off x="1918498" y="3465303"/>
+              <a:ext cx="1573590" cy="1406355"/>
+            </a:xfrm>
+            <a:prstGeom prst="roundRect">
+              <a:avLst/>
+            </a:prstGeom>
+            <a:solidFill>
+              <a:schemeClr val="bg1">
+                <a:lumMod val="50000"/>
+                <a:lumOff val="50000"/>
+              </a:schemeClr>
+            </a:solidFill>
+            <a:effectLst>
+              <a:outerShdw blurRad="50800" dist="38100" dir="5400000" algn="t" rotWithShape="0">
+                <a:prstClr val="black">
+                  <a:alpha val="40000"/>
+                </a:prstClr>
+              </a:outerShdw>
+            </a:effectLst>
+            <a:scene3d>
+              <a:camera prst="orthographicFront"/>
+              <a:lightRig rig="threePt" dir="t"/>
+            </a:scene3d>
+            <a:sp3d>
+              <a:bevelT/>
+            </a:sp3d>
+          </p:spPr>
+          <p:style>
+            <a:lnRef idx="2">
+              <a:schemeClr val="accent1">
+                <a:shade val="50000"/>
+              </a:schemeClr>
+            </a:lnRef>
+            <a:fillRef idx="1">
+              <a:schemeClr val="accent1"/>
+            </a:fillRef>
+            <a:effectRef idx="0">
+              <a:schemeClr val="accent1"/>
+            </a:effectRef>
+            <a:fontRef idx="minor">
+              <a:schemeClr val="lt1"/>
+            </a:fontRef>
+          </p:style>
+          <p:txBody>
+            <a:bodyPr rtlCol="0" anchor="ctr">
+              <a:normAutofit/>
+            </a:bodyPr>
+            <a:lstStyle/>
+            <a:p>
+              <a:pPr algn="ctr"/>
+              <a:r>
+                <a:rPr lang="en-US" sz="1400" dirty="0">
+                  <a:effectLst>
+                    <a:outerShdw blurRad="38100" dist="38100" dir="2700000" algn="tl">
+                      <a:srgbClr val="000000">
+                        <a:alpha val="43137"/>
+                      </a:srgbClr>
+                    </a:outerShdw>
+                  </a:effectLst>
+                </a:rPr>
+                <a:t>Backgammon program created by </a:t>
+              </a:r>
+              <a:r>
+                <a:rPr lang="en-US" sz="1400" dirty="0" err="1">
+                  <a:effectLst>
+                    <a:outerShdw blurRad="38100" dist="38100" dir="2700000" algn="tl">
+                      <a:srgbClr val="000000">
+                        <a:alpha val="43137"/>
+                      </a:srgbClr>
+                    </a:outerShdw>
+                  </a:effectLst>
+                </a:rPr>
+                <a:t>Tesauro</a:t>
+              </a:r>
+              <a:r>
+                <a:rPr lang="en-US" sz="1400" dirty="0">
+                  <a:effectLst>
+                    <a:outerShdw blurRad="38100" dist="38100" dir="2700000" algn="tl">
+                      <a:srgbClr val="000000">
+                        <a:alpha val="43137"/>
+                      </a:srgbClr>
+                    </a:outerShdw>
+                  </a:effectLst>
+                </a:rPr>
+                <a:t> matches top human players</a:t>
+              </a:r>
+            </a:p>
+          </p:txBody>
+        </p:sp>
+        <p:sp>
+          <p:nvSpPr>
+            <p:cNvPr id="10" name="Rectangle: Rounded Corners 9">
+              <a:extLst>
+                <a:ext uri="{FF2B5EF4-FFF2-40B4-BE49-F238E27FC236}">
+                  <a16:creationId xmlns:a16="http://schemas.microsoft.com/office/drawing/2014/main" id="{A969AC36-C6FE-49F7-9251-F1ABD342FF01}"/>
+                </a:ext>
+              </a:extLst>
+            </p:cNvPr>
+            <p:cNvSpPr/>
+            <p:nvPr/>
+          </p:nvSpPr>
+          <p:spPr>
+            <a:xfrm>
+              <a:off x="3559590" y="3465303"/>
+              <a:ext cx="1573590" cy="1406355"/>
+            </a:xfrm>
+            <a:prstGeom prst="roundRect">
+              <a:avLst/>
+            </a:prstGeom>
+            <a:solidFill>
+              <a:srgbClr val="00B050"/>
+            </a:solidFill>
+            <a:effectLst>
+              <a:outerShdw blurRad="50800" dist="38100" dir="5400000" algn="t" rotWithShape="0">
+                <a:prstClr val="black">
+                  <a:alpha val="40000"/>
+                </a:prstClr>
+              </a:outerShdw>
+            </a:effectLst>
+            <a:scene3d>
+              <a:camera prst="orthographicFront"/>
+              <a:lightRig rig="threePt" dir="t"/>
+            </a:scene3d>
+            <a:sp3d>
+              <a:bevelT/>
+            </a:sp3d>
+          </p:spPr>
+          <p:style>
+            <a:lnRef idx="2">
+              <a:schemeClr val="accent1">
+                <a:shade val="50000"/>
+              </a:schemeClr>
+            </a:lnRef>
+            <a:fillRef idx="1">
+              <a:schemeClr val="accent1"/>
+            </a:fillRef>
+            <a:effectRef idx="0">
+              <a:schemeClr val="accent1"/>
+            </a:effectRef>
+            <a:fontRef idx="minor">
+              <a:schemeClr val="lt1"/>
+            </a:fontRef>
+          </p:style>
+          <p:txBody>
+            <a:bodyPr rtlCol="0" anchor="ctr">
+              <a:normAutofit/>
+            </a:bodyPr>
+            <a:lstStyle/>
+            <a:p>
+              <a:pPr algn="ctr"/>
+              <a:r>
+                <a:rPr lang="en-US" sz="1400" dirty="0">
+                  <a:effectLst>
+                    <a:outerShdw blurRad="38100" dist="38100" dir="2700000" algn="tl">
+                      <a:srgbClr val="000000">
+                        <a:alpha val="43137"/>
+                      </a:srgbClr>
+                    </a:outerShdw>
+                  </a:effectLst>
+                </a:rPr>
+                <a:t>Hinton creates the term “deep learning”</a:t>
+              </a:r>
+            </a:p>
+          </p:txBody>
+        </p:sp>
+        <p:sp>
+          <p:nvSpPr>
+            <p:cNvPr id="18" name="Rectangle: Rounded Corners 17">
+              <a:extLst>
+                <a:ext uri="{FF2B5EF4-FFF2-40B4-BE49-F238E27FC236}">
+                  <a16:creationId xmlns:a16="http://schemas.microsoft.com/office/drawing/2014/main" id="{6FFE2DB0-1AB2-45CD-884A-1B67630B5580}"/>
+                </a:ext>
+              </a:extLst>
+            </p:cNvPr>
+            <p:cNvSpPr/>
+            <p:nvPr/>
+          </p:nvSpPr>
+          <p:spPr>
+            <a:xfrm>
+              <a:off x="6841774" y="3465303"/>
+              <a:ext cx="1704726" cy="1406355"/>
+            </a:xfrm>
+            <a:prstGeom prst="roundRect">
+              <a:avLst/>
+            </a:prstGeom>
+            <a:solidFill>
+              <a:schemeClr val="bg1">
+                <a:lumMod val="50000"/>
+                <a:lumOff val="50000"/>
+              </a:schemeClr>
+            </a:solidFill>
+            <a:effectLst>
+              <a:outerShdw blurRad="50800" dist="38100" dir="5400000" algn="t" rotWithShape="0">
+                <a:prstClr val="black">
+                  <a:alpha val="40000"/>
+                </a:prstClr>
+              </a:outerShdw>
+            </a:effectLst>
+            <a:scene3d>
+              <a:camera prst="orthographicFront"/>
+              <a:lightRig rig="threePt" dir="t"/>
+            </a:scene3d>
+            <a:sp3d>
+              <a:bevelT/>
+            </a:sp3d>
+          </p:spPr>
+          <p:style>
+            <a:lnRef idx="2">
+              <a:schemeClr val="accent1">
+                <a:shade val="50000"/>
+              </a:schemeClr>
+            </a:lnRef>
+            <a:fillRef idx="1">
+              <a:schemeClr val="accent1"/>
+            </a:fillRef>
+            <a:effectRef idx="0">
+              <a:schemeClr val="accent1"/>
+            </a:effectRef>
+            <a:fontRef idx="minor">
+              <a:schemeClr val="lt1"/>
+            </a:fontRef>
+          </p:style>
+          <p:txBody>
+            <a:bodyPr rtlCol="0" anchor="ctr">
+              <a:normAutofit/>
+            </a:bodyPr>
+            <a:lstStyle/>
+            <a:p>
+              <a:pPr algn="ctr"/>
+              <a:r>
+                <a:rPr lang="en-US" sz="1400" dirty="0">
+                  <a:effectLst>
+                    <a:outerShdw blurRad="38100" dist="38100" dir="2700000" algn="tl">
+                      <a:srgbClr val="000000">
+                        <a:alpha val="43137"/>
+                      </a:srgbClr>
+                    </a:outerShdw>
+                  </a:effectLst>
+                </a:rPr>
+                <a:t>ImageNet research paper published on model to greatly reduce error in image recognition</a:t>
+              </a:r>
+            </a:p>
+          </p:txBody>
+        </p:sp>
+        <p:sp>
+          <p:nvSpPr>
+            <p:cNvPr id="26" name="Rectangle: Rounded Corners 25">
+              <a:extLst>
+                <a:ext uri="{FF2B5EF4-FFF2-40B4-BE49-F238E27FC236}">
+                  <a16:creationId xmlns:a16="http://schemas.microsoft.com/office/drawing/2014/main" id="{69341E42-A338-4509-87C2-6D2A256A0EFE}"/>
+                </a:ext>
+              </a:extLst>
+            </p:cNvPr>
+            <p:cNvSpPr/>
+            <p:nvPr/>
+          </p:nvSpPr>
+          <p:spPr>
+            <a:xfrm>
+              <a:off x="10255094" y="3465303"/>
+              <a:ext cx="1573590" cy="1406355"/>
+            </a:xfrm>
+            <a:prstGeom prst="roundRect">
+              <a:avLst/>
+            </a:prstGeom>
+            <a:solidFill>
+              <a:schemeClr val="bg1">
+                <a:lumMod val="50000"/>
+                <a:lumOff val="50000"/>
+              </a:schemeClr>
+            </a:solidFill>
+            <a:effectLst>
+              <a:outerShdw blurRad="50800" dist="38100" dir="5400000" algn="t" rotWithShape="0">
+                <a:prstClr val="black">
+                  <a:alpha val="40000"/>
+                </a:prstClr>
+              </a:outerShdw>
+            </a:effectLst>
+            <a:scene3d>
+              <a:camera prst="orthographicFront"/>
+              <a:lightRig rig="threePt" dir="t"/>
+            </a:scene3d>
+            <a:sp3d>
+              <a:bevelT/>
+            </a:sp3d>
+          </p:spPr>
+          <p:style>
+            <a:lnRef idx="2">
+              <a:schemeClr val="accent1">
+                <a:shade val="50000"/>
+              </a:schemeClr>
+            </a:lnRef>
+            <a:fillRef idx="1">
+              <a:schemeClr val="accent1"/>
+            </a:fillRef>
+            <a:effectRef idx="0">
+              <a:schemeClr val="accent1"/>
+            </a:effectRef>
+            <a:fontRef idx="minor">
+              <a:schemeClr val="lt1"/>
+            </a:fontRef>
+          </p:style>
+          <p:txBody>
+            <a:bodyPr rtlCol="0" anchor="ctr">
+              <a:normAutofit/>
+            </a:bodyPr>
+            <a:lstStyle/>
+            <a:p>
+              <a:pPr algn="ctr"/>
+              <a:r>
+                <a:rPr lang="en-US" sz="1400" dirty="0">
+                  <a:effectLst>
+                    <a:outerShdw blurRad="38100" dist="38100" dir="2700000" algn="tl">
+                      <a:srgbClr val="000000">
+                        <a:alpha val="43137"/>
+                      </a:srgbClr>
+                    </a:outerShdw>
+                  </a:effectLst>
+                </a:rPr>
+                <a:t>Google DeepMind’s AlphaGo defeats renowned Go player Lee Sedol</a:t>
+              </a:r>
+            </a:p>
+          </p:txBody>
+        </p:sp>
+      </p:grpSp>
+      <p:grpSp>
+        <p:nvGrpSpPr>
+          <p:cNvPr id="69" name="Group 68">
+            <a:extLst>
+              <a:ext uri="{FF2B5EF4-FFF2-40B4-BE49-F238E27FC236}">
+                <a16:creationId xmlns:a16="http://schemas.microsoft.com/office/drawing/2014/main" id="{FE5EE50A-010B-49AC-B914-18E7365AB89D}"/>
+              </a:ext>
+            </a:extLst>
+          </p:cNvPr>
+          <p:cNvGrpSpPr/>
+          <p:nvPr/>
+        </p:nvGrpSpPr>
+        <p:grpSpPr>
+          <a:xfrm>
+            <a:off x="317355" y="3274543"/>
+            <a:ext cx="11552946" cy="341913"/>
+            <a:chOff x="277406" y="3057726"/>
+            <a:chExt cx="11552946" cy="341913"/>
+          </a:xfrm>
+        </p:grpSpPr>
+        <p:sp>
+          <p:nvSpPr>
+            <p:cNvPr id="32" name="Rectangle: Rounded Corners 31">
+              <a:extLst>
+                <a:ext uri="{FF2B5EF4-FFF2-40B4-BE49-F238E27FC236}">
+                  <a16:creationId xmlns:a16="http://schemas.microsoft.com/office/drawing/2014/main" id="{9A303D87-60A9-47DC-B5C6-8E4BB3098011}"/>
+                </a:ext>
+              </a:extLst>
+            </p:cNvPr>
+            <p:cNvSpPr/>
+            <p:nvPr/>
+          </p:nvSpPr>
+          <p:spPr>
+            <a:xfrm>
+              <a:off x="277406" y="3057726"/>
+              <a:ext cx="1573590" cy="341913"/>
+            </a:xfrm>
+            <a:prstGeom prst="roundRect">
+              <a:avLst/>
+            </a:prstGeom>
+            <a:effectLst>
+              <a:outerShdw blurRad="50800" dist="38100" dir="5400000" algn="t" rotWithShape="0">
+                <a:prstClr val="black">
+                  <a:alpha val="40000"/>
+                </a:prstClr>
+              </a:outerShdw>
+            </a:effectLst>
+            <a:scene3d>
+              <a:camera prst="orthographicFront"/>
+              <a:lightRig rig="threePt" dir="t"/>
+            </a:scene3d>
+            <a:sp3d>
+              <a:bevelT/>
+            </a:sp3d>
+          </p:spPr>
+          <p:style>
+            <a:lnRef idx="2">
+              <a:schemeClr val="accent3">
+                <a:shade val="50000"/>
+              </a:schemeClr>
+            </a:lnRef>
+            <a:fillRef idx="1">
+              <a:schemeClr val="accent3"/>
+            </a:fillRef>
+            <a:effectRef idx="0">
+              <a:schemeClr val="accent3"/>
+            </a:effectRef>
+            <a:fontRef idx="minor">
+              <a:schemeClr val="lt1"/>
+            </a:fontRef>
+          </p:style>
+          <p:txBody>
+            <a:bodyPr rtlCol="0" anchor="ctr">
+              <a:noAutofit/>
+            </a:bodyPr>
+            <a:lstStyle/>
+            <a:p>
+              <a:pPr algn="ctr"/>
+              <a:r>
+                <a:rPr lang="en-US" sz="1600" dirty="0">
+                  <a:effectLst>
+                    <a:outerShdw blurRad="38100" dist="38100" dir="2700000" algn="tl">
+                      <a:srgbClr val="000000">
+                        <a:alpha val="43137"/>
+                      </a:srgbClr>
+                    </a:outerShdw>
+                  </a:effectLst>
+                </a:rPr>
+                <a:t>1986:</a:t>
+              </a:r>
+            </a:p>
+          </p:txBody>
+        </p:sp>
+        <p:sp>
+          <p:nvSpPr>
+            <p:cNvPr id="36" name="Rectangle: Rounded Corners 35">
+              <a:extLst>
+                <a:ext uri="{FF2B5EF4-FFF2-40B4-BE49-F238E27FC236}">
+                  <a16:creationId xmlns:a16="http://schemas.microsoft.com/office/drawing/2014/main" id="{79D4FCB4-9373-44BC-B809-EF716CC0B9D3}"/>
+                </a:ext>
+              </a:extLst>
+            </p:cNvPr>
+            <p:cNvSpPr/>
+            <p:nvPr/>
+          </p:nvSpPr>
+          <p:spPr>
+            <a:xfrm>
+              <a:off x="5267084" y="3057726"/>
+              <a:ext cx="1573590" cy="341913"/>
+            </a:xfrm>
+            <a:prstGeom prst="roundRect">
+              <a:avLst/>
+            </a:prstGeom>
+            <a:effectLst>
+              <a:outerShdw blurRad="50800" dist="38100" dir="5400000" algn="t" rotWithShape="0">
+                <a:prstClr val="black">
+                  <a:alpha val="40000"/>
+                </a:prstClr>
+              </a:outerShdw>
+            </a:effectLst>
+            <a:scene3d>
+              <a:camera prst="orthographicFront"/>
+              <a:lightRig rig="threePt" dir="t"/>
+            </a:scene3d>
+            <a:sp3d>
+              <a:bevelT/>
+            </a:sp3d>
+          </p:spPr>
+          <p:style>
+            <a:lnRef idx="2">
+              <a:schemeClr val="accent3">
+                <a:shade val="50000"/>
+              </a:schemeClr>
+            </a:lnRef>
+            <a:fillRef idx="1">
+              <a:schemeClr val="accent3"/>
+            </a:fillRef>
+            <a:effectRef idx="0">
+              <a:schemeClr val="accent3"/>
+            </a:effectRef>
+            <a:fontRef idx="minor">
+              <a:schemeClr val="lt1"/>
+            </a:fontRef>
+          </p:style>
+          <p:txBody>
+            <a:bodyPr rtlCol="0" anchor="ctr">
+              <a:noAutofit/>
+            </a:bodyPr>
+            <a:lstStyle/>
+            <a:p>
+              <a:pPr algn="ctr"/>
+              <a:r>
+                <a:rPr lang="en-US" sz="1600" dirty="0">
+                  <a:effectLst>
+                    <a:outerShdw blurRad="38100" dist="38100" dir="2700000" algn="tl">
+                      <a:srgbClr val="000000">
+                        <a:alpha val="43137"/>
+                      </a:srgbClr>
+                    </a:outerShdw>
+                  </a:effectLst>
+                </a:rPr>
+                <a:t>2010: </a:t>
+              </a:r>
+            </a:p>
+          </p:txBody>
+        </p:sp>
+        <p:sp>
+          <p:nvSpPr>
+            <p:cNvPr id="42" name="Rectangle: Rounded Corners 41">
+              <a:extLst>
+                <a:ext uri="{FF2B5EF4-FFF2-40B4-BE49-F238E27FC236}">
+                  <a16:creationId xmlns:a16="http://schemas.microsoft.com/office/drawing/2014/main" id="{CD2E6C58-E9F7-4402-B0FA-2E6C63DC3E60}"/>
+                </a:ext>
+              </a:extLst>
+            </p:cNvPr>
+            <p:cNvSpPr/>
+            <p:nvPr/>
+          </p:nvSpPr>
+          <p:spPr>
+            <a:xfrm>
+              <a:off x="8593536" y="3057726"/>
+              <a:ext cx="1573590" cy="341913"/>
+            </a:xfrm>
+            <a:prstGeom prst="roundRect">
+              <a:avLst/>
+            </a:prstGeom>
+            <a:effectLst>
+              <a:outerShdw blurRad="50800" dist="38100" dir="5400000" algn="t" rotWithShape="0">
+                <a:prstClr val="black">
+                  <a:alpha val="40000"/>
+                </a:prstClr>
+              </a:outerShdw>
+            </a:effectLst>
+            <a:scene3d>
+              <a:camera prst="orthographicFront"/>
+              <a:lightRig rig="threePt" dir="t"/>
+            </a:scene3d>
+            <a:sp3d>
+              <a:bevelT/>
+            </a:sp3d>
+          </p:spPr>
+          <p:style>
+            <a:lnRef idx="2">
+              <a:schemeClr val="accent3">
+                <a:shade val="50000"/>
+              </a:schemeClr>
+            </a:lnRef>
+            <a:fillRef idx="1">
+              <a:schemeClr val="accent3"/>
+            </a:fillRef>
+            <a:effectRef idx="0">
+              <a:schemeClr val="accent3"/>
+            </a:effectRef>
+            <a:fontRef idx="minor">
+              <a:schemeClr val="lt1"/>
+            </a:fontRef>
+          </p:style>
+          <p:txBody>
+            <a:bodyPr rtlCol="0" anchor="ctr">
+              <a:noAutofit/>
+            </a:bodyPr>
+            <a:lstStyle/>
+            <a:p>
+              <a:pPr algn="ctr"/>
+              <a:r>
+                <a:rPr lang="en-US" sz="1600" dirty="0">
+                  <a:effectLst>
+                    <a:outerShdw blurRad="38100" dist="38100" dir="2700000" algn="tl">
+                      <a:srgbClr val="000000">
+                        <a:alpha val="43137"/>
+                      </a:srgbClr>
+                    </a:outerShdw>
+                  </a:effectLst>
+                </a:rPr>
+                <a:t>2015:</a:t>
+              </a:r>
+            </a:p>
+          </p:txBody>
+        </p:sp>
+        <p:sp>
+          <p:nvSpPr>
+            <p:cNvPr id="30" name="Rectangle: Rounded Corners 29">
+              <a:extLst>
+                <a:ext uri="{FF2B5EF4-FFF2-40B4-BE49-F238E27FC236}">
+                  <a16:creationId xmlns:a16="http://schemas.microsoft.com/office/drawing/2014/main" id="{D74F671D-6E14-4050-B5D2-E6B7FEC0E847}"/>
+                </a:ext>
+              </a:extLst>
+            </p:cNvPr>
+            <p:cNvSpPr/>
+            <p:nvPr/>
+          </p:nvSpPr>
+          <p:spPr>
+            <a:xfrm>
+              <a:off x="1940632" y="3057726"/>
+              <a:ext cx="1573590" cy="341913"/>
+            </a:xfrm>
+            <a:prstGeom prst="roundRect">
+              <a:avLst/>
+            </a:prstGeom>
+            <a:effectLst>
+              <a:outerShdw blurRad="50800" dist="38100" dir="5400000" algn="t" rotWithShape="0">
+                <a:prstClr val="black">
+                  <a:alpha val="40000"/>
+                </a:prstClr>
+              </a:outerShdw>
+            </a:effectLst>
+            <a:scene3d>
+              <a:camera prst="orthographicFront"/>
+              <a:lightRig rig="threePt" dir="t"/>
+            </a:scene3d>
+            <a:sp3d>
+              <a:bevelT/>
+            </a:sp3d>
+          </p:spPr>
+          <p:style>
+            <a:lnRef idx="2">
+              <a:schemeClr val="accent3">
+                <a:shade val="50000"/>
+              </a:schemeClr>
+            </a:lnRef>
+            <a:fillRef idx="1">
+              <a:schemeClr val="accent3"/>
+            </a:fillRef>
+            <a:effectRef idx="0">
+              <a:schemeClr val="accent3"/>
+            </a:effectRef>
+            <a:fontRef idx="minor">
+              <a:schemeClr val="lt1"/>
+            </a:fontRef>
+          </p:style>
+          <p:txBody>
+            <a:bodyPr rtlCol="0" anchor="ctr">
+              <a:noAutofit/>
+            </a:bodyPr>
+            <a:lstStyle/>
+            <a:p>
+              <a:pPr algn="ctr"/>
+              <a:r>
+                <a:rPr lang="en-US" sz="1600" dirty="0">
+                  <a:effectLst>
+                    <a:outerShdw blurRad="38100" dist="38100" dir="2700000" algn="tl">
+                      <a:srgbClr val="000000">
+                        <a:alpha val="43137"/>
+                      </a:srgbClr>
+                    </a:outerShdw>
+                  </a:effectLst>
+                </a:rPr>
+                <a:t>1992:</a:t>
+              </a:r>
+            </a:p>
+          </p:txBody>
+        </p:sp>
+        <p:sp>
+          <p:nvSpPr>
+            <p:cNvPr id="46" name="Rectangle: Rounded Corners 45">
+              <a:extLst>
+                <a:ext uri="{FF2B5EF4-FFF2-40B4-BE49-F238E27FC236}">
+                  <a16:creationId xmlns:a16="http://schemas.microsoft.com/office/drawing/2014/main" id="{047C4D81-0A2F-4F27-B378-00A723140CA7}"/>
+                </a:ext>
+              </a:extLst>
+            </p:cNvPr>
+            <p:cNvSpPr/>
+            <p:nvPr/>
+          </p:nvSpPr>
+          <p:spPr>
+            <a:xfrm>
+              <a:off x="3603858" y="3057726"/>
+              <a:ext cx="1573590" cy="341913"/>
+            </a:xfrm>
+            <a:prstGeom prst="roundRect">
+              <a:avLst/>
+            </a:prstGeom>
+            <a:effectLst>
+              <a:outerShdw blurRad="50800" dist="38100" dir="5400000" algn="t" rotWithShape="0">
+                <a:prstClr val="black">
+                  <a:alpha val="40000"/>
+                </a:prstClr>
+              </a:outerShdw>
+            </a:effectLst>
+            <a:scene3d>
+              <a:camera prst="orthographicFront"/>
+              <a:lightRig rig="threePt" dir="t"/>
+            </a:scene3d>
+            <a:sp3d>
+              <a:bevelT/>
+            </a:sp3d>
+          </p:spPr>
+          <p:style>
+            <a:lnRef idx="2">
+              <a:schemeClr val="accent3">
+                <a:shade val="50000"/>
+              </a:schemeClr>
+            </a:lnRef>
+            <a:fillRef idx="1">
+              <a:schemeClr val="accent3"/>
+            </a:fillRef>
+            <a:effectRef idx="0">
+              <a:schemeClr val="accent3"/>
+            </a:effectRef>
+            <a:fontRef idx="minor">
+              <a:schemeClr val="lt1"/>
+            </a:fontRef>
+          </p:style>
+          <p:txBody>
+            <a:bodyPr rtlCol="0" anchor="ctr">
+              <a:noAutofit/>
+            </a:bodyPr>
+            <a:lstStyle/>
+            <a:p>
+              <a:pPr algn="ctr"/>
+              <a:r>
+                <a:rPr lang="en-US" sz="1600">
+                  <a:effectLst>
+                    <a:outerShdw blurRad="38100" dist="38100" dir="2700000" algn="tl">
+                      <a:srgbClr val="000000">
+                        <a:alpha val="43137"/>
+                      </a:srgbClr>
+                    </a:outerShdw>
+                  </a:effectLst>
+                </a:rPr>
+                <a:t>2006:</a:t>
+              </a:r>
+              <a:endParaRPr lang="en-US" sz="1600" dirty="0">
                 <a:effectLst>
                   <a:outerShdw blurRad="38100" dist="38100" dir="2700000" algn="tl">
                     <a:srgbClr val="000000">
@@ -10086,1286 +10444,157 @@
                     </a:srgbClr>
                   </a:outerShdw>
                 </a:effectLst>
-              </a:rPr>
-              <a:t>1997:</a:t>
-            </a:r>
-          </a:p>
-        </p:txBody>
-      </p:sp>
-      <p:sp>
-        <p:nvSpPr>
-          <p:cNvPr id="36" name="Rectangle: Rounded Corners 35">
-            <a:extLst>
-              <a:ext uri="{FF2B5EF4-FFF2-40B4-BE49-F238E27FC236}">
-                <a16:creationId xmlns:a16="http://schemas.microsoft.com/office/drawing/2014/main" id="{79D4FCB4-9373-44BC-B809-EF716CC0B9D3}"/>
-              </a:ext>
-            </a:extLst>
-          </p:cNvPr>
-          <p:cNvSpPr/>
-          <p:nvPr/>
-        </p:nvSpPr>
-        <p:spPr>
-          <a:xfrm>
-            <a:off x="3913575" y="3950083"/>
-            <a:ext cx="1260630" cy="341913"/>
-          </a:xfrm>
-          <a:prstGeom prst="roundRect">
-            <a:avLst/>
-          </a:prstGeom>
-          <a:effectLst>
-            <a:outerShdw blurRad="50800" dist="38100" dir="5400000" algn="t" rotWithShape="0">
-              <a:prstClr val="black">
-                <a:alpha val="40000"/>
-              </a:prstClr>
-            </a:outerShdw>
-          </a:effectLst>
-          <a:scene3d>
-            <a:camera prst="orthographicFront"/>
-            <a:lightRig rig="threePt" dir="t"/>
-          </a:scene3d>
-          <a:sp3d>
-            <a:bevelT/>
-          </a:sp3d>
-        </p:spPr>
-        <p:style>
-          <a:lnRef idx="2">
-            <a:schemeClr val="accent3">
-              <a:shade val="50000"/>
-            </a:schemeClr>
-          </a:lnRef>
-          <a:fillRef idx="1">
-            <a:schemeClr val="accent3"/>
-          </a:fillRef>
-          <a:effectRef idx="0">
-            <a:schemeClr val="accent3"/>
-          </a:effectRef>
-          <a:fontRef idx="minor">
-            <a:schemeClr val="lt1"/>
-          </a:fontRef>
-        </p:style>
-        <p:txBody>
-          <a:bodyPr rtlCol="0" anchor="ctr">
-            <a:noAutofit/>
-          </a:bodyPr>
-          <a:lstStyle/>
-          <a:p>
-            <a:pPr algn="ctr"/>
-            <a:r>
-              <a:rPr lang="en-US" sz="1600" dirty="0">
-                <a:effectLst>
-                  <a:outerShdw blurRad="38100" dist="38100" dir="2700000" algn="tl">
-                    <a:srgbClr val="000000">
-                      <a:alpha val="43137"/>
-                    </a:srgbClr>
-                  </a:outerShdw>
-                </a:effectLst>
-              </a:rPr>
-              <a:t>2010: </a:t>
-            </a:r>
-          </a:p>
-        </p:txBody>
-      </p:sp>
-      <p:sp>
-        <p:nvSpPr>
-          <p:cNvPr id="38" name="Rectangle: Rounded Corners 37">
-            <a:extLst>
-              <a:ext uri="{FF2B5EF4-FFF2-40B4-BE49-F238E27FC236}">
-                <a16:creationId xmlns:a16="http://schemas.microsoft.com/office/drawing/2014/main" id="{4D9060C3-045D-4238-86FC-87EFB97830B3}"/>
-              </a:ext>
-            </a:extLst>
-          </p:cNvPr>
-          <p:cNvSpPr/>
-          <p:nvPr/>
-        </p:nvSpPr>
-        <p:spPr>
-          <a:xfrm>
-            <a:off x="5465686" y="3950083"/>
-            <a:ext cx="1260630" cy="341913"/>
-          </a:xfrm>
-          <a:prstGeom prst="roundRect">
-            <a:avLst/>
-          </a:prstGeom>
-          <a:effectLst>
-            <a:outerShdw blurRad="50800" dist="38100" dir="5400000" algn="t" rotWithShape="0">
-              <a:prstClr val="black">
-                <a:alpha val="40000"/>
-              </a:prstClr>
-            </a:outerShdw>
-          </a:effectLst>
-          <a:scene3d>
-            <a:camera prst="orthographicFront"/>
-            <a:lightRig rig="threePt" dir="t"/>
-          </a:scene3d>
-          <a:sp3d>
-            <a:bevelT/>
-          </a:sp3d>
-        </p:spPr>
-        <p:style>
-          <a:lnRef idx="2">
-            <a:schemeClr val="accent3">
-              <a:shade val="50000"/>
-            </a:schemeClr>
-          </a:lnRef>
-          <a:fillRef idx="1">
-            <a:schemeClr val="accent3"/>
-          </a:fillRef>
-          <a:effectRef idx="0">
-            <a:schemeClr val="accent3"/>
-          </a:effectRef>
-          <a:fontRef idx="minor">
-            <a:schemeClr val="lt1"/>
-          </a:fontRef>
-        </p:style>
-        <p:txBody>
-          <a:bodyPr rtlCol="0" anchor="ctr">
-            <a:noAutofit/>
-          </a:bodyPr>
-          <a:lstStyle/>
-          <a:p>
-            <a:pPr algn="ctr"/>
-            <a:r>
-              <a:rPr lang="en-US" sz="1600" dirty="0">
-                <a:effectLst>
-                  <a:outerShdw blurRad="38100" dist="38100" dir="2700000" algn="tl">
-                    <a:srgbClr val="000000">
-                      <a:alpha val="43137"/>
-                    </a:srgbClr>
-                  </a:outerShdw>
-                </a:effectLst>
-              </a:rPr>
-              <a:t>2011:</a:t>
-            </a:r>
-          </a:p>
-        </p:txBody>
-      </p:sp>
-      <p:sp>
-        <p:nvSpPr>
-          <p:cNvPr id="40" name="Rectangle: Rounded Corners 39">
-            <a:extLst>
-              <a:ext uri="{FF2B5EF4-FFF2-40B4-BE49-F238E27FC236}">
-                <a16:creationId xmlns:a16="http://schemas.microsoft.com/office/drawing/2014/main" id="{AEFD7799-176E-4320-8FEA-7C2B7DE8122D}"/>
-              </a:ext>
-            </a:extLst>
-          </p:cNvPr>
-          <p:cNvSpPr/>
-          <p:nvPr/>
-        </p:nvSpPr>
-        <p:spPr>
-          <a:xfrm>
-            <a:off x="7017797" y="3950083"/>
-            <a:ext cx="1260630" cy="341913"/>
-          </a:xfrm>
-          <a:prstGeom prst="roundRect">
-            <a:avLst/>
-          </a:prstGeom>
-          <a:effectLst>
-            <a:outerShdw blurRad="50800" dist="38100" dir="5400000" algn="t" rotWithShape="0">
-              <a:prstClr val="black">
-                <a:alpha val="40000"/>
-              </a:prstClr>
-            </a:outerShdw>
-          </a:effectLst>
-          <a:scene3d>
-            <a:camera prst="orthographicFront"/>
-            <a:lightRig rig="threePt" dir="t"/>
-          </a:scene3d>
-          <a:sp3d>
-            <a:bevelT/>
-          </a:sp3d>
-        </p:spPr>
-        <p:style>
-          <a:lnRef idx="2">
-            <a:schemeClr val="accent3">
-              <a:shade val="50000"/>
-            </a:schemeClr>
-          </a:lnRef>
-          <a:fillRef idx="1">
-            <a:schemeClr val="accent3"/>
-          </a:fillRef>
-          <a:effectRef idx="0">
-            <a:schemeClr val="accent3"/>
-          </a:effectRef>
-          <a:fontRef idx="minor">
-            <a:schemeClr val="lt1"/>
-          </a:fontRef>
-        </p:style>
-        <p:txBody>
-          <a:bodyPr rtlCol="0" anchor="ctr">
-            <a:noAutofit/>
-          </a:bodyPr>
-          <a:lstStyle/>
-          <a:p>
-            <a:pPr algn="ctr"/>
-            <a:r>
-              <a:rPr lang="en-US" sz="1600" dirty="0">
-                <a:effectLst>
-                  <a:outerShdw blurRad="38100" dist="38100" dir="2700000" algn="tl">
-                    <a:srgbClr val="000000">
-                      <a:alpha val="43137"/>
-                    </a:srgbClr>
-                  </a:outerShdw>
-                </a:effectLst>
-              </a:rPr>
-              <a:t>2014: </a:t>
-            </a:r>
-          </a:p>
-        </p:txBody>
-      </p:sp>
-      <p:sp>
-        <p:nvSpPr>
-          <p:cNvPr id="42" name="Rectangle: Rounded Corners 41">
-            <a:extLst>
-              <a:ext uri="{FF2B5EF4-FFF2-40B4-BE49-F238E27FC236}">
-                <a16:creationId xmlns:a16="http://schemas.microsoft.com/office/drawing/2014/main" id="{CD2E6C58-E9F7-4402-B0FA-2E6C63DC3E60}"/>
-              </a:ext>
-            </a:extLst>
-          </p:cNvPr>
-          <p:cNvSpPr/>
-          <p:nvPr/>
-        </p:nvSpPr>
-        <p:spPr>
-          <a:xfrm>
-            <a:off x="8569908" y="3950083"/>
-            <a:ext cx="1260630" cy="341913"/>
-          </a:xfrm>
-          <a:prstGeom prst="roundRect">
-            <a:avLst/>
-          </a:prstGeom>
-          <a:effectLst>
-            <a:outerShdw blurRad="50800" dist="38100" dir="5400000" algn="t" rotWithShape="0">
-              <a:prstClr val="black">
-                <a:alpha val="40000"/>
-              </a:prstClr>
-            </a:outerShdw>
-          </a:effectLst>
-          <a:scene3d>
-            <a:camera prst="orthographicFront"/>
-            <a:lightRig rig="threePt" dir="t"/>
-          </a:scene3d>
-          <a:sp3d>
-            <a:bevelT/>
-          </a:sp3d>
-        </p:spPr>
-        <p:style>
-          <a:lnRef idx="2">
-            <a:schemeClr val="accent3">
-              <a:shade val="50000"/>
-            </a:schemeClr>
-          </a:lnRef>
-          <a:fillRef idx="1">
-            <a:schemeClr val="accent3"/>
-          </a:fillRef>
-          <a:effectRef idx="0">
-            <a:schemeClr val="accent3"/>
-          </a:effectRef>
-          <a:fontRef idx="minor">
-            <a:schemeClr val="lt1"/>
-          </a:fontRef>
-        </p:style>
-        <p:txBody>
-          <a:bodyPr rtlCol="0" anchor="ctr">
-            <a:noAutofit/>
-          </a:bodyPr>
-          <a:lstStyle/>
-          <a:p>
-            <a:pPr algn="ctr"/>
-            <a:r>
-              <a:rPr lang="en-US" sz="1600" dirty="0">
-                <a:effectLst>
-                  <a:outerShdw blurRad="38100" dist="38100" dir="2700000" algn="tl">
-                    <a:srgbClr val="000000">
-                      <a:alpha val="43137"/>
-                    </a:srgbClr>
-                  </a:outerShdw>
-                </a:effectLst>
-              </a:rPr>
-              <a:t>2015:</a:t>
-            </a:r>
-          </a:p>
-        </p:txBody>
-      </p:sp>
-      <p:sp>
-        <p:nvSpPr>
-          <p:cNvPr id="44" name="Rectangle: Rounded Corners 43">
-            <a:extLst>
-              <a:ext uri="{FF2B5EF4-FFF2-40B4-BE49-F238E27FC236}">
-                <a16:creationId xmlns:a16="http://schemas.microsoft.com/office/drawing/2014/main" id="{DBDACA71-3C1C-46B6-B6A9-DE2213DA72B2}"/>
-              </a:ext>
-            </a:extLst>
-          </p:cNvPr>
-          <p:cNvSpPr/>
-          <p:nvPr/>
-        </p:nvSpPr>
-        <p:spPr>
-          <a:xfrm>
-            <a:off x="10122017" y="3950083"/>
-            <a:ext cx="1260630" cy="341913"/>
-          </a:xfrm>
-          <a:prstGeom prst="roundRect">
-            <a:avLst/>
-          </a:prstGeom>
-          <a:effectLst>
-            <a:outerShdw blurRad="50800" dist="38100" dir="5400000" algn="t" rotWithShape="0">
-              <a:prstClr val="black">
-                <a:alpha val="40000"/>
-              </a:prstClr>
-            </a:outerShdw>
-          </a:effectLst>
-          <a:scene3d>
-            <a:camera prst="orthographicFront"/>
-            <a:lightRig rig="threePt" dir="t"/>
-          </a:scene3d>
-          <a:sp3d>
-            <a:bevelT/>
-          </a:sp3d>
-        </p:spPr>
-        <p:style>
-          <a:lnRef idx="2">
-            <a:schemeClr val="accent3">
-              <a:shade val="50000"/>
-            </a:schemeClr>
-          </a:lnRef>
-          <a:fillRef idx="1">
-            <a:schemeClr val="accent3"/>
-          </a:fillRef>
-          <a:effectRef idx="0">
-            <a:schemeClr val="accent3"/>
-          </a:effectRef>
-          <a:fontRef idx="minor">
-            <a:schemeClr val="lt1"/>
-          </a:fontRef>
-        </p:style>
-        <p:txBody>
-          <a:bodyPr rtlCol="0" anchor="ctr">
-            <a:noAutofit/>
-          </a:bodyPr>
-          <a:lstStyle/>
-          <a:p>
-            <a:pPr algn="ctr"/>
-            <a:r>
-              <a:rPr lang="en-US" sz="1600" dirty="0">
-                <a:effectLst>
-                  <a:outerShdw blurRad="38100" dist="38100" dir="2700000" algn="tl">
-                    <a:srgbClr val="000000">
-                      <a:alpha val="43137"/>
-                    </a:srgbClr>
-                  </a:outerShdw>
-                </a:effectLst>
-              </a:rPr>
-              <a:t>2017:</a:t>
-            </a:r>
-          </a:p>
-        </p:txBody>
-      </p:sp>
-      <p:sp>
-        <p:nvSpPr>
-          <p:cNvPr id="6" name="Rectangle: Rounded Corners 5">
-            <a:extLst>
-              <a:ext uri="{FF2B5EF4-FFF2-40B4-BE49-F238E27FC236}">
-                <a16:creationId xmlns:a16="http://schemas.microsoft.com/office/drawing/2014/main" id="{4C4C857B-F97E-4B19-8451-973B6FEBFF69}"/>
-              </a:ext>
-            </a:extLst>
-          </p:cNvPr>
-          <p:cNvSpPr/>
-          <p:nvPr/>
-        </p:nvSpPr>
-        <p:spPr>
-          <a:xfrm>
-            <a:off x="1582818" y="1656240"/>
-            <a:ext cx="1260630" cy="1642369"/>
-          </a:xfrm>
-          <a:prstGeom prst="roundRect">
-            <a:avLst/>
-          </a:prstGeom>
-          <a:effectLst>
-            <a:outerShdw blurRad="50800" dist="38100" dir="5400000" algn="t" rotWithShape="0">
-              <a:prstClr val="black">
-                <a:alpha val="40000"/>
-              </a:prstClr>
-            </a:outerShdw>
-          </a:effectLst>
-          <a:scene3d>
-            <a:camera prst="orthographicFront"/>
-            <a:lightRig rig="threePt" dir="t"/>
-          </a:scene3d>
-          <a:sp3d>
-            <a:bevelT/>
-          </a:sp3d>
-        </p:spPr>
-        <p:style>
-          <a:lnRef idx="2">
-            <a:schemeClr val="accent1">
-              <a:shade val="50000"/>
-            </a:schemeClr>
-          </a:lnRef>
-          <a:fillRef idx="1">
-            <a:schemeClr val="accent1"/>
-          </a:fillRef>
-          <a:effectRef idx="0">
-            <a:schemeClr val="accent1"/>
-          </a:effectRef>
-          <a:fontRef idx="minor">
-            <a:schemeClr val="lt1"/>
-          </a:fontRef>
-        </p:style>
-        <p:txBody>
-          <a:bodyPr rtlCol="0" anchor="ctr">
-            <a:normAutofit lnSpcReduction="10000"/>
-          </a:bodyPr>
-          <a:lstStyle/>
-          <a:p>
-            <a:pPr algn="ctr"/>
-            <a:r>
-              <a:rPr lang="en-US" sz="1400" dirty="0">
-                <a:effectLst>
-                  <a:outerShdw blurRad="38100" dist="38100" dir="2700000" algn="tl">
-                    <a:srgbClr val="000000">
-                      <a:alpha val="43137"/>
-                    </a:srgbClr>
-                  </a:outerShdw>
-                </a:effectLst>
-              </a:rPr>
-              <a:t>Backgammon program created by </a:t>
-            </a:r>
-            <a:r>
-              <a:rPr lang="en-US" sz="1400" dirty="0" err="1">
-                <a:effectLst>
-                  <a:outerShdw blurRad="38100" dist="38100" dir="2700000" algn="tl">
-                    <a:srgbClr val="000000">
-                      <a:alpha val="43137"/>
-                    </a:srgbClr>
-                  </a:outerShdw>
-                </a:effectLst>
-              </a:rPr>
-              <a:t>Tesauro</a:t>
-            </a:r>
-            <a:r>
-              <a:rPr lang="en-US" sz="1400" dirty="0">
-                <a:effectLst>
-                  <a:outerShdw blurRad="38100" dist="38100" dir="2700000" algn="tl">
-                    <a:srgbClr val="000000">
-                      <a:alpha val="43137"/>
-                    </a:srgbClr>
-                  </a:outerShdw>
-                </a:effectLst>
-              </a:rPr>
-              <a:t> matches top human players</a:t>
-            </a:r>
-          </a:p>
-        </p:txBody>
-      </p:sp>
-      <p:sp>
-        <p:nvSpPr>
-          <p:cNvPr id="10" name="Rectangle: Rounded Corners 9">
-            <a:extLst>
-              <a:ext uri="{FF2B5EF4-FFF2-40B4-BE49-F238E27FC236}">
-                <a16:creationId xmlns:a16="http://schemas.microsoft.com/office/drawing/2014/main" id="{A969AC36-C6FE-49F7-9251-F1ABD342FF01}"/>
-              </a:ext>
-            </a:extLst>
-          </p:cNvPr>
-          <p:cNvSpPr/>
-          <p:nvPr/>
-        </p:nvSpPr>
-        <p:spPr>
-          <a:xfrm>
-            <a:off x="3114954" y="1656240"/>
-            <a:ext cx="1260630" cy="1642369"/>
-          </a:xfrm>
-          <a:prstGeom prst="roundRect">
-            <a:avLst/>
-          </a:prstGeom>
-          <a:effectLst>
-            <a:outerShdw blurRad="50800" dist="38100" dir="5400000" algn="t" rotWithShape="0">
-              <a:prstClr val="black">
-                <a:alpha val="40000"/>
-              </a:prstClr>
-            </a:outerShdw>
-          </a:effectLst>
-          <a:scene3d>
-            <a:camera prst="orthographicFront"/>
-            <a:lightRig rig="threePt" dir="t"/>
-          </a:scene3d>
-          <a:sp3d>
-            <a:bevelT/>
-          </a:sp3d>
-        </p:spPr>
-        <p:style>
-          <a:lnRef idx="2">
-            <a:schemeClr val="accent1">
-              <a:shade val="50000"/>
-            </a:schemeClr>
-          </a:lnRef>
-          <a:fillRef idx="1">
-            <a:schemeClr val="accent1"/>
-          </a:fillRef>
-          <a:effectRef idx="0">
-            <a:schemeClr val="accent1"/>
-          </a:effectRef>
-          <a:fontRef idx="minor">
-            <a:schemeClr val="lt1"/>
-          </a:fontRef>
-        </p:style>
-        <p:txBody>
-          <a:bodyPr rtlCol="0" anchor="ctr">
-            <a:normAutofit/>
-          </a:bodyPr>
-          <a:lstStyle/>
-          <a:p>
-            <a:pPr algn="ctr"/>
-            <a:r>
-              <a:rPr lang="en-US" sz="1400" dirty="0">
-                <a:effectLst>
-                  <a:outerShdw blurRad="38100" dist="38100" dir="2700000" algn="tl">
-                    <a:srgbClr val="000000">
-                      <a:alpha val="43137"/>
-                    </a:srgbClr>
-                  </a:outerShdw>
-                </a:effectLst>
-              </a:rPr>
-              <a:t>Hinton creates the term “deep learning”</a:t>
-            </a:r>
-          </a:p>
-        </p:txBody>
-      </p:sp>
-      <p:sp>
-        <p:nvSpPr>
-          <p:cNvPr id="14" name="Rectangle: Rounded Corners 13">
-            <a:extLst>
-              <a:ext uri="{FF2B5EF4-FFF2-40B4-BE49-F238E27FC236}">
-                <a16:creationId xmlns:a16="http://schemas.microsoft.com/office/drawing/2014/main" id="{255EF98C-0549-45F8-ADD7-D315C94DD257}"/>
-              </a:ext>
-            </a:extLst>
-          </p:cNvPr>
-          <p:cNvSpPr/>
-          <p:nvPr/>
-        </p:nvSpPr>
-        <p:spPr>
-          <a:xfrm>
-            <a:off x="4647090" y="1656240"/>
-            <a:ext cx="1260630" cy="1642369"/>
-          </a:xfrm>
-          <a:prstGeom prst="roundRect">
-            <a:avLst/>
-          </a:prstGeom>
-          <a:effectLst>
-            <a:outerShdw blurRad="50800" dist="38100" dir="5400000" algn="t" rotWithShape="0">
-              <a:prstClr val="black">
-                <a:alpha val="40000"/>
-              </a:prstClr>
-            </a:outerShdw>
-          </a:effectLst>
-          <a:scene3d>
-            <a:camera prst="orthographicFront"/>
-            <a:lightRig rig="threePt" dir="t"/>
-          </a:scene3d>
-          <a:sp3d>
-            <a:bevelT/>
-          </a:sp3d>
-        </p:spPr>
-        <p:style>
-          <a:lnRef idx="2">
-            <a:schemeClr val="accent1">
-              <a:shade val="50000"/>
-            </a:schemeClr>
-          </a:lnRef>
-          <a:fillRef idx="1">
-            <a:schemeClr val="accent1"/>
-          </a:fillRef>
-          <a:effectRef idx="0">
-            <a:schemeClr val="accent1"/>
-          </a:effectRef>
-          <a:fontRef idx="minor">
-            <a:schemeClr val="lt1"/>
-          </a:fontRef>
-        </p:style>
-        <p:txBody>
-          <a:bodyPr rtlCol="0" anchor="ctr">
-            <a:normAutofit/>
-          </a:bodyPr>
-          <a:lstStyle/>
-          <a:p>
-            <a:pPr algn="ctr"/>
-            <a:r>
-              <a:rPr lang="en-US" sz="1400" dirty="0">
-                <a:effectLst>
-                  <a:outerShdw blurRad="38100" dist="38100" dir="2700000" algn="tl">
-                    <a:srgbClr val="000000">
-                      <a:alpha val="43137"/>
-                    </a:srgbClr>
-                  </a:outerShdw>
-                </a:effectLst>
-              </a:rPr>
-              <a:t>IBM’s Watson defeats Jeopardy champions</a:t>
-            </a:r>
-          </a:p>
-        </p:txBody>
-      </p:sp>
-      <p:sp>
-        <p:nvSpPr>
-          <p:cNvPr id="18" name="Rectangle: Rounded Corners 17">
-            <a:extLst>
-              <a:ext uri="{FF2B5EF4-FFF2-40B4-BE49-F238E27FC236}">
-                <a16:creationId xmlns:a16="http://schemas.microsoft.com/office/drawing/2014/main" id="{6FFE2DB0-1AB2-45CD-884A-1B67630B5580}"/>
-              </a:ext>
-            </a:extLst>
-          </p:cNvPr>
-          <p:cNvSpPr/>
-          <p:nvPr/>
-        </p:nvSpPr>
-        <p:spPr>
-          <a:xfrm>
-            <a:off x="6179226" y="1656240"/>
-            <a:ext cx="1365685" cy="1642369"/>
-          </a:xfrm>
-          <a:prstGeom prst="roundRect">
-            <a:avLst/>
-          </a:prstGeom>
-          <a:effectLst>
-            <a:outerShdw blurRad="50800" dist="38100" dir="5400000" algn="t" rotWithShape="0">
-              <a:prstClr val="black">
-                <a:alpha val="40000"/>
-              </a:prstClr>
-            </a:outerShdw>
-          </a:effectLst>
-          <a:scene3d>
-            <a:camera prst="orthographicFront"/>
-            <a:lightRig rig="threePt" dir="t"/>
-          </a:scene3d>
-          <a:sp3d>
-            <a:bevelT/>
-          </a:sp3d>
-        </p:spPr>
-        <p:style>
-          <a:lnRef idx="2">
-            <a:schemeClr val="accent1">
-              <a:shade val="50000"/>
-            </a:schemeClr>
-          </a:lnRef>
-          <a:fillRef idx="1">
-            <a:schemeClr val="accent1"/>
-          </a:fillRef>
-          <a:effectRef idx="0">
-            <a:schemeClr val="accent1"/>
-          </a:effectRef>
-          <a:fontRef idx="minor">
-            <a:schemeClr val="lt1"/>
-          </a:fontRef>
-        </p:style>
-        <p:txBody>
-          <a:bodyPr rtlCol="0" anchor="ctr">
-            <a:normAutofit fontScale="92500"/>
-          </a:bodyPr>
-          <a:lstStyle/>
-          <a:p>
-            <a:pPr algn="ctr"/>
-            <a:r>
-              <a:rPr lang="en-US" sz="1400" dirty="0">
-                <a:effectLst>
-                  <a:outerShdw blurRad="38100" dist="38100" dir="2700000" algn="tl">
-                    <a:srgbClr val="000000">
-                      <a:alpha val="43137"/>
-                    </a:srgbClr>
-                  </a:outerShdw>
-                </a:effectLst>
-              </a:rPr>
-              <a:t>ImageNet research paper published on model to greatly reduce error in image recognition</a:t>
-            </a:r>
-          </a:p>
-        </p:txBody>
-      </p:sp>
-      <p:sp>
-        <p:nvSpPr>
-          <p:cNvPr id="22" name="Rectangle: Rounded Corners 21">
-            <a:extLst>
-              <a:ext uri="{FF2B5EF4-FFF2-40B4-BE49-F238E27FC236}">
-                <a16:creationId xmlns:a16="http://schemas.microsoft.com/office/drawing/2014/main" id="{A92E0F05-F0AA-4502-A1D6-5C40D5ABE1E5}"/>
-              </a:ext>
-            </a:extLst>
-          </p:cNvPr>
-          <p:cNvSpPr/>
-          <p:nvPr/>
-        </p:nvSpPr>
-        <p:spPr>
-          <a:xfrm>
-            <a:off x="7816417" y="1656240"/>
-            <a:ext cx="1260630" cy="1642369"/>
-          </a:xfrm>
-          <a:prstGeom prst="roundRect">
-            <a:avLst/>
-          </a:prstGeom>
-          <a:effectLst>
-            <a:outerShdw blurRad="50800" dist="38100" dir="5400000" algn="t" rotWithShape="0">
-              <a:prstClr val="black">
-                <a:alpha val="40000"/>
-              </a:prstClr>
-            </a:outerShdw>
-          </a:effectLst>
-          <a:scene3d>
-            <a:camera prst="orthographicFront"/>
-            <a:lightRig rig="threePt" dir="t"/>
-          </a:scene3d>
-          <a:sp3d>
-            <a:bevelT/>
-          </a:sp3d>
-        </p:spPr>
-        <p:style>
-          <a:lnRef idx="2">
-            <a:schemeClr val="accent1">
-              <a:shade val="50000"/>
-            </a:schemeClr>
-          </a:lnRef>
-          <a:fillRef idx="1">
-            <a:schemeClr val="accent1"/>
-          </a:fillRef>
-          <a:effectRef idx="0">
-            <a:schemeClr val="accent1"/>
-          </a:effectRef>
-          <a:fontRef idx="minor">
-            <a:schemeClr val="lt1"/>
-          </a:fontRef>
-        </p:style>
-        <p:txBody>
-          <a:bodyPr rtlCol="0" anchor="ctr">
-            <a:normAutofit/>
-          </a:bodyPr>
-          <a:lstStyle/>
-          <a:p>
-            <a:pPr algn="ctr"/>
-            <a:r>
-              <a:rPr lang="en-US" sz="1400" dirty="0">
-                <a:effectLst>
-                  <a:outerShdw blurRad="38100" dist="38100" dir="2700000" algn="tl">
-                    <a:srgbClr val="000000">
-                      <a:alpha val="43137"/>
-                    </a:srgbClr>
-                  </a:outerShdw>
-                </a:effectLst>
-              </a:rPr>
-              <a:t>Amazon AWS Machine Learning services launched</a:t>
-            </a:r>
-          </a:p>
-        </p:txBody>
-      </p:sp>
-      <p:sp>
-        <p:nvSpPr>
-          <p:cNvPr id="26" name="Rectangle: Rounded Corners 25">
-            <a:extLst>
-              <a:ext uri="{FF2B5EF4-FFF2-40B4-BE49-F238E27FC236}">
-                <a16:creationId xmlns:a16="http://schemas.microsoft.com/office/drawing/2014/main" id="{69341E42-A338-4509-87C2-6D2A256A0EFE}"/>
-              </a:ext>
-            </a:extLst>
-          </p:cNvPr>
-          <p:cNvSpPr/>
-          <p:nvPr/>
-        </p:nvSpPr>
-        <p:spPr>
-          <a:xfrm>
-            <a:off x="9348552" y="1656240"/>
-            <a:ext cx="1260630" cy="1642369"/>
-          </a:xfrm>
-          <a:prstGeom prst="roundRect">
-            <a:avLst/>
-          </a:prstGeom>
-          <a:effectLst>
-            <a:outerShdw blurRad="50800" dist="38100" dir="5400000" algn="t" rotWithShape="0">
-              <a:prstClr val="black">
-                <a:alpha val="40000"/>
-              </a:prstClr>
-            </a:outerShdw>
-          </a:effectLst>
-          <a:scene3d>
-            <a:camera prst="orthographicFront"/>
-            <a:lightRig rig="threePt" dir="t"/>
-          </a:scene3d>
-          <a:sp3d>
-            <a:bevelT/>
-          </a:sp3d>
-        </p:spPr>
-        <p:style>
-          <a:lnRef idx="2">
-            <a:schemeClr val="accent1">
-              <a:shade val="50000"/>
-            </a:schemeClr>
-          </a:lnRef>
-          <a:fillRef idx="1">
-            <a:schemeClr val="accent1"/>
-          </a:fillRef>
-          <a:effectRef idx="0">
-            <a:schemeClr val="accent1"/>
-          </a:effectRef>
-          <a:fontRef idx="minor">
-            <a:schemeClr val="lt1"/>
-          </a:fontRef>
-        </p:style>
-        <p:txBody>
-          <a:bodyPr rtlCol="0" anchor="ctr">
-            <a:normAutofit lnSpcReduction="10000"/>
-          </a:bodyPr>
-          <a:lstStyle/>
-          <a:p>
-            <a:pPr algn="ctr"/>
-            <a:r>
-              <a:rPr lang="en-US" sz="1400" dirty="0">
-                <a:effectLst>
-                  <a:outerShdw blurRad="38100" dist="38100" dir="2700000" algn="tl">
-                    <a:srgbClr val="000000">
-                      <a:alpha val="43137"/>
-                    </a:srgbClr>
-                  </a:outerShdw>
-                </a:effectLst>
-              </a:rPr>
-              <a:t>Google DeepMind’s AlphaGo defeats renowned Go player Lee Sedol</a:t>
-            </a:r>
-          </a:p>
-        </p:txBody>
-      </p:sp>
-      <p:sp>
-        <p:nvSpPr>
-          <p:cNvPr id="30" name="Rectangle: Rounded Corners 29">
-            <a:extLst>
-              <a:ext uri="{FF2B5EF4-FFF2-40B4-BE49-F238E27FC236}">
-                <a16:creationId xmlns:a16="http://schemas.microsoft.com/office/drawing/2014/main" id="{D74F671D-6E14-4050-B5D2-E6B7FEC0E847}"/>
-              </a:ext>
-            </a:extLst>
-          </p:cNvPr>
-          <p:cNvSpPr/>
-          <p:nvPr/>
-        </p:nvSpPr>
-        <p:spPr>
-          <a:xfrm>
-            <a:off x="1582818" y="1268012"/>
-            <a:ext cx="1260630" cy="341913"/>
-          </a:xfrm>
-          <a:prstGeom prst="roundRect">
-            <a:avLst/>
-          </a:prstGeom>
-          <a:effectLst>
-            <a:outerShdw blurRad="50800" dist="38100" dir="5400000" algn="t" rotWithShape="0">
-              <a:prstClr val="black">
-                <a:alpha val="40000"/>
-              </a:prstClr>
-            </a:outerShdw>
-          </a:effectLst>
-          <a:scene3d>
-            <a:camera prst="orthographicFront"/>
-            <a:lightRig rig="threePt" dir="t"/>
-          </a:scene3d>
-          <a:sp3d>
-            <a:bevelT/>
-          </a:sp3d>
-        </p:spPr>
-        <p:style>
-          <a:lnRef idx="2">
-            <a:schemeClr val="accent3">
-              <a:shade val="50000"/>
-            </a:schemeClr>
-          </a:lnRef>
-          <a:fillRef idx="1">
-            <a:schemeClr val="accent3"/>
-          </a:fillRef>
-          <a:effectRef idx="0">
-            <a:schemeClr val="accent3"/>
-          </a:effectRef>
-          <a:fontRef idx="minor">
-            <a:schemeClr val="lt1"/>
-          </a:fontRef>
-        </p:style>
-        <p:txBody>
-          <a:bodyPr rtlCol="0" anchor="ctr">
-            <a:noAutofit/>
-          </a:bodyPr>
-          <a:lstStyle/>
-          <a:p>
-            <a:pPr algn="ctr"/>
-            <a:r>
-              <a:rPr lang="en-US" sz="1600" dirty="0">
-                <a:effectLst>
-                  <a:outerShdw blurRad="38100" dist="38100" dir="2700000" algn="tl">
-                    <a:srgbClr val="000000">
-                      <a:alpha val="43137"/>
-                    </a:srgbClr>
-                  </a:outerShdw>
-                </a:effectLst>
-              </a:rPr>
-              <a:t>1992:</a:t>
-            </a:r>
-          </a:p>
-        </p:txBody>
-      </p:sp>
-      <p:sp>
-        <p:nvSpPr>
-          <p:cNvPr id="46" name="Rectangle: Rounded Corners 45">
-            <a:extLst>
-              <a:ext uri="{FF2B5EF4-FFF2-40B4-BE49-F238E27FC236}">
-                <a16:creationId xmlns:a16="http://schemas.microsoft.com/office/drawing/2014/main" id="{047C4D81-0A2F-4F27-B378-00A723140CA7}"/>
-              </a:ext>
-            </a:extLst>
-          </p:cNvPr>
-          <p:cNvSpPr/>
-          <p:nvPr/>
-        </p:nvSpPr>
-        <p:spPr>
-          <a:xfrm>
-            <a:off x="3135965" y="1268012"/>
-            <a:ext cx="1260630" cy="341913"/>
-          </a:xfrm>
-          <a:prstGeom prst="roundRect">
-            <a:avLst/>
-          </a:prstGeom>
-          <a:effectLst>
-            <a:outerShdw blurRad="50800" dist="38100" dir="5400000" algn="t" rotWithShape="0">
-              <a:prstClr val="black">
-                <a:alpha val="40000"/>
-              </a:prstClr>
-            </a:outerShdw>
-          </a:effectLst>
-          <a:scene3d>
-            <a:camera prst="orthographicFront"/>
-            <a:lightRig rig="threePt" dir="t"/>
-          </a:scene3d>
-          <a:sp3d>
-            <a:bevelT/>
-          </a:sp3d>
-        </p:spPr>
-        <p:style>
-          <a:lnRef idx="2">
-            <a:schemeClr val="accent3">
-              <a:shade val="50000"/>
-            </a:schemeClr>
-          </a:lnRef>
-          <a:fillRef idx="1">
-            <a:schemeClr val="accent3"/>
-          </a:fillRef>
-          <a:effectRef idx="0">
-            <a:schemeClr val="accent3"/>
-          </a:effectRef>
-          <a:fontRef idx="minor">
-            <a:schemeClr val="lt1"/>
-          </a:fontRef>
-        </p:style>
-        <p:txBody>
-          <a:bodyPr rtlCol="0" anchor="ctr">
-            <a:noAutofit/>
-          </a:bodyPr>
-          <a:lstStyle/>
-          <a:p>
-            <a:pPr algn="ctr"/>
-            <a:r>
-              <a:rPr lang="en-US" sz="1600">
-                <a:effectLst>
-                  <a:outerShdw blurRad="38100" dist="38100" dir="2700000" algn="tl">
-                    <a:srgbClr val="000000">
-                      <a:alpha val="43137"/>
-                    </a:srgbClr>
-                  </a:outerShdw>
-                </a:effectLst>
-              </a:rPr>
-              <a:t>2006:</a:t>
-            </a:r>
-            <a:endParaRPr lang="en-US" sz="1600" dirty="0">
-              <a:effectLst>
-                <a:outerShdw blurRad="38100" dist="38100" dir="2700000" algn="tl">
-                  <a:srgbClr val="000000">
-                    <a:alpha val="43137"/>
-                  </a:srgbClr>
-                </a:outerShdw>
-              </a:effectLst>
-            </a:endParaRPr>
-          </a:p>
-        </p:txBody>
-      </p:sp>
-      <p:sp>
-        <p:nvSpPr>
-          <p:cNvPr id="48" name="Rectangle: Rounded Corners 47">
-            <a:extLst>
-              <a:ext uri="{FF2B5EF4-FFF2-40B4-BE49-F238E27FC236}">
-                <a16:creationId xmlns:a16="http://schemas.microsoft.com/office/drawing/2014/main" id="{7E4B2BE1-0C28-49C6-9ACF-C7325DCE52AD}"/>
-              </a:ext>
-            </a:extLst>
-          </p:cNvPr>
-          <p:cNvSpPr/>
-          <p:nvPr/>
-        </p:nvSpPr>
-        <p:spPr>
-          <a:xfrm>
-            <a:off x="4689112" y="1268012"/>
-            <a:ext cx="1260630" cy="341913"/>
-          </a:xfrm>
-          <a:prstGeom prst="roundRect">
-            <a:avLst/>
-          </a:prstGeom>
-          <a:effectLst>
-            <a:outerShdw blurRad="50800" dist="38100" dir="5400000" algn="t" rotWithShape="0">
-              <a:prstClr val="black">
-                <a:alpha val="40000"/>
-              </a:prstClr>
-            </a:outerShdw>
-          </a:effectLst>
-          <a:scene3d>
-            <a:camera prst="orthographicFront"/>
-            <a:lightRig rig="threePt" dir="t"/>
-          </a:scene3d>
-          <a:sp3d>
-            <a:bevelT/>
-          </a:sp3d>
-        </p:spPr>
-        <p:style>
-          <a:lnRef idx="2">
-            <a:schemeClr val="accent3">
-              <a:shade val="50000"/>
-            </a:schemeClr>
-          </a:lnRef>
-          <a:fillRef idx="1">
-            <a:schemeClr val="accent3"/>
-          </a:fillRef>
-          <a:effectRef idx="0">
-            <a:schemeClr val="accent3"/>
-          </a:effectRef>
-          <a:fontRef idx="minor">
-            <a:schemeClr val="lt1"/>
-          </a:fontRef>
-        </p:style>
-        <p:txBody>
-          <a:bodyPr rtlCol="0" anchor="ctr">
-            <a:noAutofit/>
-          </a:bodyPr>
-          <a:lstStyle/>
-          <a:p>
-            <a:pPr algn="ctr"/>
-            <a:r>
-              <a:rPr lang="en-US" sz="1600" dirty="0">
-                <a:effectLst>
-                  <a:outerShdw blurRad="38100" dist="38100" dir="2700000" algn="tl">
-                    <a:srgbClr val="000000">
-                      <a:alpha val="43137"/>
-                    </a:srgbClr>
-                  </a:outerShdw>
-                </a:effectLst>
-              </a:rPr>
-              <a:t>2011:</a:t>
-            </a:r>
-          </a:p>
-        </p:txBody>
-      </p:sp>
-      <p:sp>
-        <p:nvSpPr>
-          <p:cNvPr id="50" name="Rectangle: Rounded Corners 49">
-            <a:extLst>
-              <a:ext uri="{FF2B5EF4-FFF2-40B4-BE49-F238E27FC236}">
-                <a16:creationId xmlns:a16="http://schemas.microsoft.com/office/drawing/2014/main" id="{DD06F84A-8D62-4002-BB28-B4F88600E8EA}"/>
-              </a:ext>
-            </a:extLst>
-          </p:cNvPr>
-          <p:cNvSpPr/>
-          <p:nvPr/>
-        </p:nvSpPr>
-        <p:spPr>
-          <a:xfrm>
-            <a:off x="6242259" y="1268012"/>
-            <a:ext cx="1260630" cy="341913"/>
-          </a:xfrm>
-          <a:prstGeom prst="roundRect">
-            <a:avLst/>
-          </a:prstGeom>
-          <a:effectLst>
-            <a:outerShdw blurRad="50800" dist="38100" dir="5400000" algn="t" rotWithShape="0">
-              <a:prstClr val="black">
-                <a:alpha val="40000"/>
-              </a:prstClr>
-            </a:outerShdw>
-          </a:effectLst>
-          <a:scene3d>
-            <a:camera prst="orthographicFront"/>
-            <a:lightRig rig="threePt" dir="t"/>
-          </a:scene3d>
-          <a:sp3d>
-            <a:bevelT/>
-          </a:sp3d>
-        </p:spPr>
-        <p:style>
-          <a:lnRef idx="2">
-            <a:schemeClr val="accent3">
-              <a:shade val="50000"/>
-            </a:schemeClr>
-          </a:lnRef>
-          <a:fillRef idx="1">
-            <a:schemeClr val="accent3"/>
-          </a:fillRef>
-          <a:effectRef idx="0">
-            <a:schemeClr val="accent3"/>
-          </a:effectRef>
-          <a:fontRef idx="minor">
-            <a:schemeClr val="lt1"/>
-          </a:fontRef>
-        </p:style>
-        <p:txBody>
-          <a:bodyPr rtlCol="0" anchor="ctr">
-            <a:noAutofit/>
-          </a:bodyPr>
-          <a:lstStyle/>
-          <a:p>
-            <a:pPr algn="ctr"/>
-            <a:r>
-              <a:rPr lang="en-US" sz="1600" dirty="0">
-                <a:effectLst>
-                  <a:outerShdw blurRad="38100" dist="38100" dir="2700000" algn="tl">
-                    <a:srgbClr val="000000">
-                      <a:alpha val="43137"/>
-                    </a:srgbClr>
-                  </a:outerShdw>
-                </a:effectLst>
-              </a:rPr>
-              <a:t>2012:</a:t>
-            </a:r>
-          </a:p>
-        </p:txBody>
-      </p:sp>
-      <p:sp>
-        <p:nvSpPr>
-          <p:cNvPr id="52" name="Rectangle: Rounded Corners 51">
-            <a:extLst>
-              <a:ext uri="{FF2B5EF4-FFF2-40B4-BE49-F238E27FC236}">
-                <a16:creationId xmlns:a16="http://schemas.microsoft.com/office/drawing/2014/main" id="{5EB67131-3F1E-4B65-A8A1-35E430EC6F4B}"/>
-              </a:ext>
-            </a:extLst>
-          </p:cNvPr>
-          <p:cNvSpPr/>
-          <p:nvPr/>
-        </p:nvSpPr>
-        <p:spPr>
-          <a:xfrm>
-            <a:off x="7795406" y="1268012"/>
-            <a:ext cx="1260630" cy="341913"/>
-          </a:xfrm>
-          <a:prstGeom prst="roundRect">
-            <a:avLst/>
-          </a:prstGeom>
-          <a:effectLst>
-            <a:outerShdw blurRad="50800" dist="38100" dir="5400000" algn="t" rotWithShape="0">
-              <a:prstClr val="black">
-                <a:alpha val="40000"/>
-              </a:prstClr>
-            </a:outerShdw>
-          </a:effectLst>
-          <a:scene3d>
-            <a:camera prst="orthographicFront"/>
-            <a:lightRig rig="threePt" dir="t"/>
-          </a:scene3d>
-          <a:sp3d>
-            <a:bevelT/>
-          </a:sp3d>
-        </p:spPr>
-        <p:style>
-          <a:lnRef idx="2">
-            <a:schemeClr val="accent3">
-              <a:shade val="50000"/>
-            </a:schemeClr>
-          </a:lnRef>
-          <a:fillRef idx="1">
-            <a:schemeClr val="accent3"/>
-          </a:fillRef>
-          <a:effectRef idx="0">
-            <a:schemeClr val="accent3"/>
-          </a:effectRef>
-          <a:fontRef idx="minor">
-            <a:schemeClr val="lt1"/>
-          </a:fontRef>
-        </p:style>
-        <p:txBody>
-          <a:bodyPr rtlCol="0" anchor="ctr">
-            <a:noAutofit/>
-          </a:bodyPr>
-          <a:lstStyle/>
-          <a:p>
-            <a:pPr algn="ctr"/>
-            <a:r>
-              <a:rPr lang="en-US" sz="1600" dirty="0">
-                <a:effectLst>
-                  <a:outerShdw blurRad="38100" dist="38100" dir="2700000" algn="tl">
-                    <a:srgbClr val="000000">
-                      <a:alpha val="43137"/>
-                    </a:srgbClr>
-                  </a:outerShdw>
-                </a:effectLst>
-              </a:rPr>
-              <a:t>2015:</a:t>
-            </a:r>
-          </a:p>
-        </p:txBody>
-      </p:sp>
-      <p:sp>
-        <p:nvSpPr>
-          <p:cNvPr id="54" name="Rectangle: Rounded Corners 53">
-            <a:extLst>
-              <a:ext uri="{FF2B5EF4-FFF2-40B4-BE49-F238E27FC236}">
-                <a16:creationId xmlns:a16="http://schemas.microsoft.com/office/drawing/2014/main" id="{9C91A60C-614E-463A-AA55-D43BF846CF41}"/>
-              </a:ext>
-            </a:extLst>
-          </p:cNvPr>
-          <p:cNvSpPr/>
-          <p:nvPr/>
-        </p:nvSpPr>
-        <p:spPr>
-          <a:xfrm>
-            <a:off x="9348552" y="1268012"/>
-            <a:ext cx="1260630" cy="341913"/>
-          </a:xfrm>
-          <a:prstGeom prst="roundRect">
-            <a:avLst/>
-          </a:prstGeom>
-          <a:effectLst>
-            <a:outerShdw blurRad="50800" dist="38100" dir="5400000" algn="t" rotWithShape="0">
-              <a:prstClr val="black">
-                <a:alpha val="40000"/>
-              </a:prstClr>
-            </a:outerShdw>
-          </a:effectLst>
-          <a:scene3d>
-            <a:camera prst="orthographicFront"/>
-            <a:lightRig rig="threePt" dir="t"/>
-          </a:scene3d>
-          <a:sp3d>
-            <a:bevelT/>
-          </a:sp3d>
-        </p:spPr>
-        <p:style>
-          <a:lnRef idx="2">
-            <a:schemeClr val="accent3">
-              <a:shade val="50000"/>
-            </a:schemeClr>
-          </a:lnRef>
-          <a:fillRef idx="1">
-            <a:schemeClr val="accent3"/>
-          </a:fillRef>
-          <a:effectRef idx="0">
-            <a:schemeClr val="accent3"/>
-          </a:effectRef>
-          <a:fontRef idx="minor">
-            <a:schemeClr val="lt1"/>
-          </a:fontRef>
-        </p:style>
-        <p:txBody>
-          <a:bodyPr rtlCol="0" anchor="ctr">
-            <a:noAutofit/>
-          </a:bodyPr>
-          <a:lstStyle/>
-          <a:p>
-            <a:pPr algn="ctr"/>
-            <a:r>
-              <a:rPr lang="en-US" sz="1600" dirty="0">
-                <a:effectLst>
-                  <a:outerShdw blurRad="38100" dist="38100" dir="2700000" algn="tl">
-                    <a:srgbClr val="000000">
-                      <a:alpha val="43137"/>
-                    </a:srgbClr>
-                  </a:outerShdw>
-                </a:effectLst>
-              </a:rPr>
-              <a:t>2016:</a:t>
-            </a:r>
-          </a:p>
-        </p:txBody>
-      </p:sp>
+              </a:endParaRPr>
+            </a:p>
+          </p:txBody>
+        </p:sp>
+        <p:sp>
+          <p:nvSpPr>
+            <p:cNvPr id="50" name="Rectangle: Rounded Corners 49">
+              <a:extLst>
+                <a:ext uri="{FF2B5EF4-FFF2-40B4-BE49-F238E27FC236}">
+                  <a16:creationId xmlns:a16="http://schemas.microsoft.com/office/drawing/2014/main" id="{DD06F84A-8D62-4002-BB28-B4F88600E8EA}"/>
+                </a:ext>
+              </a:extLst>
+            </p:cNvPr>
+            <p:cNvSpPr/>
+            <p:nvPr/>
+          </p:nvSpPr>
+          <p:spPr>
+            <a:xfrm>
+              <a:off x="6930310" y="3057726"/>
+              <a:ext cx="1573590" cy="341913"/>
+            </a:xfrm>
+            <a:prstGeom prst="roundRect">
+              <a:avLst/>
+            </a:prstGeom>
+            <a:effectLst>
+              <a:outerShdw blurRad="50800" dist="38100" dir="5400000" algn="t" rotWithShape="0">
+                <a:prstClr val="black">
+                  <a:alpha val="40000"/>
+                </a:prstClr>
+              </a:outerShdw>
+            </a:effectLst>
+            <a:scene3d>
+              <a:camera prst="orthographicFront"/>
+              <a:lightRig rig="threePt" dir="t"/>
+            </a:scene3d>
+            <a:sp3d>
+              <a:bevelT/>
+            </a:sp3d>
+          </p:spPr>
+          <p:style>
+            <a:lnRef idx="2">
+              <a:schemeClr val="accent3">
+                <a:shade val="50000"/>
+              </a:schemeClr>
+            </a:lnRef>
+            <a:fillRef idx="1">
+              <a:schemeClr val="accent3"/>
+            </a:fillRef>
+            <a:effectRef idx="0">
+              <a:schemeClr val="accent3"/>
+            </a:effectRef>
+            <a:fontRef idx="minor">
+              <a:schemeClr val="lt1"/>
+            </a:fontRef>
+          </p:style>
+          <p:txBody>
+            <a:bodyPr rtlCol="0" anchor="ctr">
+              <a:noAutofit/>
+            </a:bodyPr>
+            <a:lstStyle/>
+            <a:p>
+              <a:pPr algn="ctr"/>
+              <a:r>
+                <a:rPr lang="en-US" sz="1600" dirty="0">
+                  <a:effectLst>
+                    <a:outerShdw blurRad="38100" dist="38100" dir="2700000" algn="tl">
+                      <a:srgbClr val="000000">
+                        <a:alpha val="43137"/>
+                      </a:srgbClr>
+                    </a:outerShdw>
+                  </a:effectLst>
+                </a:rPr>
+                <a:t>2012:</a:t>
+              </a:r>
+            </a:p>
+          </p:txBody>
+        </p:sp>
+        <p:sp>
+          <p:nvSpPr>
+            <p:cNvPr id="54" name="Rectangle: Rounded Corners 53">
+              <a:extLst>
+                <a:ext uri="{FF2B5EF4-FFF2-40B4-BE49-F238E27FC236}">
+                  <a16:creationId xmlns:a16="http://schemas.microsoft.com/office/drawing/2014/main" id="{9C91A60C-614E-463A-AA55-D43BF846CF41}"/>
+                </a:ext>
+              </a:extLst>
+            </p:cNvPr>
+            <p:cNvSpPr/>
+            <p:nvPr/>
+          </p:nvSpPr>
+          <p:spPr>
+            <a:xfrm>
+              <a:off x="10256762" y="3057726"/>
+              <a:ext cx="1573590" cy="341913"/>
+            </a:xfrm>
+            <a:prstGeom prst="roundRect">
+              <a:avLst/>
+            </a:prstGeom>
+            <a:effectLst>
+              <a:outerShdw blurRad="50800" dist="38100" dir="5400000" algn="t" rotWithShape="0">
+                <a:prstClr val="black">
+                  <a:alpha val="40000"/>
+                </a:prstClr>
+              </a:outerShdw>
+            </a:effectLst>
+            <a:scene3d>
+              <a:camera prst="orthographicFront"/>
+              <a:lightRig rig="threePt" dir="t"/>
+            </a:scene3d>
+            <a:sp3d>
+              <a:bevelT/>
+            </a:sp3d>
+          </p:spPr>
+          <p:style>
+            <a:lnRef idx="2">
+              <a:schemeClr val="accent3">
+                <a:shade val="50000"/>
+              </a:schemeClr>
+            </a:lnRef>
+            <a:fillRef idx="1">
+              <a:schemeClr val="accent3"/>
+            </a:fillRef>
+            <a:effectRef idx="0">
+              <a:schemeClr val="accent3"/>
+            </a:effectRef>
+            <a:fontRef idx="minor">
+              <a:schemeClr val="lt1"/>
+            </a:fontRef>
+          </p:style>
+          <p:txBody>
+            <a:bodyPr rtlCol="0" anchor="ctr">
+              <a:noAutofit/>
+            </a:bodyPr>
+            <a:lstStyle/>
+            <a:p>
+              <a:pPr algn="ctr"/>
+              <a:r>
+                <a:rPr lang="en-US" sz="1600" dirty="0">
+                  <a:effectLst>
+                    <a:outerShdw blurRad="38100" dist="38100" dir="2700000" algn="tl">
+                      <a:srgbClr val="000000">
+                        <a:alpha val="43137"/>
+                      </a:srgbClr>
+                    </a:outerShdw>
+                  </a:effectLst>
+                </a:rPr>
+                <a:t>2016:</a:t>
+              </a:r>
+            </a:p>
+          </p:txBody>
+        </p:sp>
+      </p:grpSp>
       <p:sp>
         <p:nvSpPr>
           <p:cNvPr id="57" name="Arrow: Right 56">
@@ -11380,7 +10609,7 @@
         </p:nvSpPr>
         <p:spPr>
           <a:xfrm>
-            <a:off x="319088" y="3429000"/>
+            <a:off x="316916" y="2874252"/>
             <a:ext cx="11553825" cy="341913"/>
           </a:xfrm>
           <a:prstGeom prst="rightArrow">
@@ -11432,6 +10661,1200 @@
           </a:p>
         </p:txBody>
       </p:sp>
+      <p:grpSp>
+        <p:nvGrpSpPr>
+          <p:cNvPr id="66" name="Group 65">
+            <a:extLst>
+              <a:ext uri="{FF2B5EF4-FFF2-40B4-BE49-F238E27FC236}">
+                <a16:creationId xmlns:a16="http://schemas.microsoft.com/office/drawing/2014/main" id="{9B349312-8E81-4751-809E-F33EB0DEB55E}"/>
+              </a:ext>
+            </a:extLst>
+          </p:cNvPr>
+          <p:cNvGrpSpPr/>
+          <p:nvPr/>
+        </p:nvGrpSpPr>
+        <p:grpSpPr>
+          <a:xfrm>
+            <a:off x="1108823" y="1392472"/>
+            <a:ext cx="9970011" cy="1406355"/>
+            <a:chOff x="1140547" y="1175655"/>
+            <a:chExt cx="9970011" cy="1406355"/>
+          </a:xfrm>
+        </p:grpSpPr>
+        <p:sp>
+          <p:nvSpPr>
+            <p:cNvPr id="8" name="Rectangle: Rounded Corners 7">
+              <a:extLst>
+                <a:ext uri="{FF2B5EF4-FFF2-40B4-BE49-F238E27FC236}">
+                  <a16:creationId xmlns:a16="http://schemas.microsoft.com/office/drawing/2014/main" id="{DCF959EA-9F1E-4369-88A6-E8074AEA0289}"/>
+                </a:ext>
+              </a:extLst>
+            </p:cNvPr>
+            <p:cNvSpPr/>
+            <p:nvPr/>
+          </p:nvSpPr>
+          <p:spPr>
+            <a:xfrm>
+              <a:off x="2819831" y="1175655"/>
+              <a:ext cx="1573590" cy="1406355"/>
+            </a:xfrm>
+            <a:prstGeom prst="roundRect">
+              <a:avLst/>
+            </a:prstGeom>
+            <a:solidFill>
+              <a:schemeClr val="bg1">
+                <a:lumMod val="50000"/>
+                <a:lumOff val="50000"/>
+              </a:schemeClr>
+            </a:solidFill>
+            <a:effectLst>
+              <a:outerShdw blurRad="50800" dist="38100" dir="5400000" algn="t" rotWithShape="0">
+                <a:prstClr val="black">
+                  <a:alpha val="40000"/>
+                </a:prstClr>
+              </a:outerShdw>
+            </a:effectLst>
+            <a:scene3d>
+              <a:camera prst="orthographicFront"/>
+              <a:lightRig rig="threePt" dir="t"/>
+            </a:scene3d>
+            <a:sp3d>
+              <a:bevelT/>
+            </a:sp3d>
+          </p:spPr>
+          <p:style>
+            <a:lnRef idx="2">
+              <a:schemeClr val="accent1">
+                <a:shade val="50000"/>
+              </a:schemeClr>
+            </a:lnRef>
+            <a:fillRef idx="1">
+              <a:schemeClr val="accent1"/>
+            </a:fillRef>
+            <a:effectRef idx="0">
+              <a:schemeClr val="accent1"/>
+            </a:effectRef>
+            <a:fontRef idx="minor">
+              <a:schemeClr val="lt1"/>
+            </a:fontRef>
+          </p:style>
+          <p:txBody>
+            <a:bodyPr rtlCol="0" anchor="ctr">
+              <a:normAutofit/>
+            </a:bodyPr>
+            <a:lstStyle/>
+            <a:p>
+              <a:pPr algn="ctr"/>
+              <a:r>
+                <a:rPr lang="en-US" sz="1400" dirty="0">
+                  <a:effectLst>
+                    <a:outerShdw blurRad="38100" dist="38100" dir="2700000" algn="tl">
+                      <a:srgbClr val="000000">
+                        <a:alpha val="43137"/>
+                      </a:srgbClr>
+                    </a:outerShdw>
+                  </a:effectLst>
+                </a:rPr>
+                <a:t>IBM’s Deep Blue defeats world chess champion Kasparov </a:t>
+              </a:r>
+            </a:p>
+          </p:txBody>
+        </p:sp>
+        <p:sp>
+          <p:nvSpPr>
+            <p:cNvPr id="16" name="Rectangle: Rounded Corners 15">
+              <a:extLst>
+                <a:ext uri="{FF2B5EF4-FFF2-40B4-BE49-F238E27FC236}">
+                  <a16:creationId xmlns:a16="http://schemas.microsoft.com/office/drawing/2014/main" id="{E4788FB9-BF38-481B-8799-A57217A9B43B}"/>
+                </a:ext>
+              </a:extLst>
+            </p:cNvPr>
+            <p:cNvSpPr/>
+            <p:nvPr/>
+          </p:nvSpPr>
+          <p:spPr>
+            <a:xfrm>
+              <a:off x="6178399" y="1175655"/>
+              <a:ext cx="1573590" cy="1406355"/>
+            </a:xfrm>
+            <a:prstGeom prst="roundRect">
+              <a:avLst/>
+            </a:prstGeom>
+            <a:solidFill>
+              <a:schemeClr val="bg1">
+                <a:lumMod val="50000"/>
+                <a:lumOff val="50000"/>
+              </a:schemeClr>
+            </a:solidFill>
+            <a:effectLst>
+              <a:outerShdw blurRad="50800" dist="38100" dir="5400000" algn="t" rotWithShape="0">
+                <a:prstClr val="black">
+                  <a:alpha val="40000"/>
+                </a:prstClr>
+              </a:outerShdw>
+            </a:effectLst>
+            <a:scene3d>
+              <a:camera prst="orthographicFront"/>
+              <a:lightRig rig="threePt" dir="t"/>
+            </a:scene3d>
+            <a:sp3d>
+              <a:bevelT/>
+            </a:sp3d>
+          </p:spPr>
+          <p:style>
+            <a:lnRef idx="2">
+              <a:schemeClr val="accent1">
+                <a:shade val="50000"/>
+              </a:schemeClr>
+            </a:lnRef>
+            <a:fillRef idx="1">
+              <a:schemeClr val="accent1"/>
+            </a:fillRef>
+            <a:effectRef idx="0">
+              <a:schemeClr val="accent1"/>
+            </a:effectRef>
+            <a:fontRef idx="minor">
+              <a:schemeClr val="lt1"/>
+            </a:fontRef>
+          </p:style>
+          <p:txBody>
+            <a:bodyPr rtlCol="0" anchor="ctr">
+              <a:normAutofit/>
+            </a:bodyPr>
+            <a:lstStyle/>
+            <a:p>
+              <a:pPr algn="ctr"/>
+              <a:r>
+                <a:rPr lang="en-US" sz="1400" dirty="0">
+                  <a:effectLst>
+                    <a:outerShdw blurRad="38100" dist="38100" dir="2700000" algn="tl">
+                      <a:srgbClr val="000000">
+                        <a:alpha val="43137"/>
+                      </a:srgbClr>
+                    </a:outerShdw>
+                  </a:effectLst>
+                </a:rPr>
+                <a:t>Google Brain deep neural network can discover and categorize items</a:t>
+              </a:r>
+            </a:p>
+          </p:txBody>
+        </p:sp>
+        <p:sp>
+          <p:nvSpPr>
+            <p:cNvPr id="22" name="Rectangle: Rounded Corners 21">
+              <a:extLst>
+                <a:ext uri="{FF2B5EF4-FFF2-40B4-BE49-F238E27FC236}">
+                  <a16:creationId xmlns:a16="http://schemas.microsoft.com/office/drawing/2014/main" id="{A92E0F05-F0AA-4502-A1D6-5C40D5ABE1E5}"/>
+                </a:ext>
+              </a:extLst>
+            </p:cNvPr>
+            <p:cNvSpPr/>
+            <p:nvPr/>
+          </p:nvSpPr>
+          <p:spPr>
+            <a:xfrm>
+              <a:off x="7857683" y="1175655"/>
+              <a:ext cx="1573590" cy="1406355"/>
+            </a:xfrm>
+            <a:prstGeom prst="roundRect">
+              <a:avLst/>
+            </a:prstGeom>
+            <a:solidFill>
+              <a:srgbClr val="00B050"/>
+            </a:solidFill>
+            <a:effectLst>
+              <a:outerShdw blurRad="50800" dist="38100" dir="5400000" algn="t" rotWithShape="0">
+                <a:prstClr val="black">
+                  <a:alpha val="40000"/>
+                </a:prstClr>
+              </a:outerShdw>
+            </a:effectLst>
+            <a:scene3d>
+              <a:camera prst="orthographicFront"/>
+              <a:lightRig rig="threePt" dir="t"/>
+            </a:scene3d>
+            <a:sp3d>
+              <a:bevelT/>
+            </a:sp3d>
+          </p:spPr>
+          <p:style>
+            <a:lnRef idx="2">
+              <a:schemeClr val="accent1">
+                <a:shade val="50000"/>
+              </a:schemeClr>
+            </a:lnRef>
+            <a:fillRef idx="1">
+              <a:schemeClr val="accent1"/>
+            </a:fillRef>
+            <a:effectRef idx="0">
+              <a:schemeClr val="accent1"/>
+            </a:effectRef>
+            <a:fontRef idx="minor">
+              <a:schemeClr val="lt1"/>
+            </a:fontRef>
+          </p:style>
+          <p:txBody>
+            <a:bodyPr rtlCol="0" anchor="ctr">
+              <a:normAutofit/>
+            </a:bodyPr>
+            <a:lstStyle/>
+            <a:p>
+              <a:pPr algn="ctr"/>
+              <a:r>
+                <a:rPr lang="en-US" sz="1400" dirty="0">
+                  <a:effectLst>
+                    <a:outerShdw blurRad="38100" dist="38100" dir="2700000" algn="tl">
+                      <a:srgbClr val="000000">
+                        <a:alpha val="43137"/>
+                      </a:srgbClr>
+                    </a:outerShdw>
+                  </a:effectLst>
+                </a:rPr>
+                <a:t>Amazon AWS Machine Learning services launched</a:t>
+              </a:r>
+            </a:p>
+          </p:txBody>
+        </p:sp>
+        <p:sp>
+          <p:nvSpPr>
+            <p:cNvPr id="3" name="Rectangle: Rounded Corners 2">
+              <a:extLst>
+                <a:ext uri="{FF2B5EF4-FFF2-40B4-BE49-F238E27FC236}">
+                  <a16:creationId xmlns:a16="http://schemas.microsoft.com/office/drawing/2014/main" id="{7B6C8123-8FFB-4A13-9A9A-A65DAB091298}"/>
+                </a:ext>
+              </a:extLst>
+            </p:cNvPr>
+            <p:cNvSpPr/>
+            <p:nvPr/>
+          </p:nvSpPr>
+          <p:spPr>
+            <a:xfrm>
+              <a:off x="1140547" y="1175655"/>
+              <a:ext cx="1573590" cy="1406355"/>
+            </a:xfrm>
+            <a:prstGeom prst="roundRect">
+              <a:avLst/>
+            </a:prstGeom>
+            <a:solidFill>
+              <a:srgbClr val="00B0F0"/>
+            </a:solidFill>
+            <a:effectLst>
+              <a:outerShdw blurRad="50800" dist="38100" dir="5400000" algn="t" rotWithShape="0">
+                <a:prstClr val="black">
+                  <a:alpha val="40000"/>
+                </a:prstClr>
+              </a:outerShdw>
+            </a:effectLst>
+            <a:scene3d>
+              <a:camera prst="orthographicFront"/>
+              <a:lightRig rig="threePt" dir="t"/>
+            </a:scene3d>
+            <a:sp3d>
+              <a:bevelT/>
+            </a:sp3d>
+          </p:spPr>
+          <p:style>
+            <a:lnRef idx="2">
+              <a:schemeClr val="accent1">
+                <a:shade val="50000"/>
+              </a:schemeClr>
+            </a:lnRef>
+            <a:fillRef idx="1">
+              <a:schemeClr val="accent1"/>
+            </a:fillRef>
+            <a:effectRef idx="0">
+              <a:schemeClr val="accent1"/>
+            </a:effectRef>
+            <a:fontRef idx="minor">
+              <a:schemeClr val="lt1"/>
+            </a:fontRef>
+          </p:style>
+          <p:txBody>
+            <a:bodyPr rtlCol="0" anchor="ctr">
+              <a:normAutofit/>
+            </a:bodyPr>
+            <a:lstStyle/>
+            <a:p>
+              <a:pPr algn="ctr"/>
+              <a:r>
+                <a:rPr lang="en-US" sz="1400" dirty="0">
+                  <a:effectLst>
+                    <a:outerShdw blurRad="38100" dist="38100" dir="2700000" algn="tl">
+                      <a:srgbClr val="000000">
+                        <a:alpha val="43137"/>
+                      </a:srgbClr>
+                    </a:outerShdw>
+                  </a:effectLst>
+                </a:rPr>
+                <a:t>UCI Machine Learning Repository (MLR) Launched as FTP Archive</a:t>
+              </a:r>
+            </a:p>
+          </p:txBody>
+        </p:sp>
+        <p:sp>
+          <p:nvSpPr>
+            <p:cNvPr id="7" name="Rectangle: Rounded Corners 6">
+              <a:extLst>
+                <a:ext uri="{FF2B5EF4-FFF2-40B4-BE49-F238E27FC236}">
+                  <a16:creationId xmlns:a16="http://schemas.microsoft.com/office/drawing/2014/main" id="{2C29A7F5-A65B-4AFF-9EA9-2DCEC1371237}"/>
+                </a:ext>
+              </a:extLst>
+            </p:cNvPr>
+            <p:cNvSpPr/>
+            <p:nvPr/>
+          </p:nvSpPr>
+          <p:spPr>
+            <a:xfrm>
+              <a:off x="4499115" y="1175655"/>
+              <a:ext cx="1573590" cy="1406355"/>
+            </a:xfrm>
+            <a:prstGeom prst="roundRect">
+              <a:avLst/>
+            </a:prstGeom>
+            <a:solidFill>
+              <a:srgbClr val="00B0F0"/>
+            </a:solidFill>
+            <a:effectLst>
+              <a:outerShdw blurRad="50800" dist="38100" dir="5400000" algn="t" rotWithShape="0">
+                <a:prstClr val="black">
+                  <a:alpha val="40000"/>
+                </a:prstClr>
+              </a:outerShdw>
+            </a:effectLst>
+            <a:scene3d>
+              <a:camera prst="orthographicFront"/>
+              <a:lightRig rig="threePt" dir="t"/>
+            </a:scene3d>
+            <a:sp3d>
+              <a:bevelT/>
+            </a:sp3d>
+          </p:spPr>
+          <p:style>
+            <a:lnRef idx="2">
+              <a:schemeClr val="accent1">
+                <a:shade val="50000"/>
+              </a:schemeClr>
+            </a:lnRef>
+            <a:fillRef idx="1">
+              <a:schemeClr val="accent1"/>
+            </a:fillRef>
+            <a:effectRef idx="0">
+              <a:schemeClr val="accent1"/>
+            </a:effectRef>
+            <a:fontRef idx="minor">
+              <a:schemeClr val="lt1"/>
+            </a:fontRef>
+          </p:style>
+          <p:txBody>
+            <a:bodyPr rtlCol="0" anchor="ctr">
+              <a:normAutofit/>
+            </a:bodyPr>
+            <a:lstStyle/>
+            <a:p>
+              <a:pPr algn="ctr"/>
+              <a:r>
+                <a:rPr lang="en-US" sz="1400" dirty="0">
+                  <a:effectLst>
+                    <a:outerShdw blurRad="38100" dist="38100" dir="2700000" algn="tl">
+                      <a:srgbClr val="000000">
+                        <a:alpha val="43137"/>
+                      </a:srgbClr>
+                    </a:outerShdw>
+                  </a:effectLst>
+                </a:rPr>
+                <a:t>UCI MLR Transition to Current Website</a:t>
+              </a:r>
+            </a:p>
+          </p:txBody>
+        </p:sp>
+        <p:sp>
+          <p:nvSpPr>
+            <p:cNvPr id="11" name="Rectangle: Rounded Corners 10">
+              <a:extLst>
+                <a:ext uri="{FF2B5EF4-FFF2-40B4-BE49-F238E27FC236}">
+                  <a16:creationId xmlns:a16="http://schemas.microsoft.com/office/drawing/2014/main" id="{3C14FCDB-035E-4D0B-960F-7DBCEFD421EE}"/>
+                </a:ext>
+              </a:extLst>
+            </p:cNvPr>
+            <p:cNvSpPr/>
+            <p:nvPr/>
+          </p:nvSpPr>
+          <p:spPr>
+            <a:xfrm>
+              <a:off x="9536968" y="1175655"/>
+              <a:ext cx="1573590" cy="1406355"/>
+            </a:xfrm>
+            <a:prstGeom prst="roundRect">
+              <a:avLst/>
+            </a:prstGeom>
+            <a:solidFill>
+              <a:srgbClr val="00B0F0"/>
+            </a:solidFill>
+            <a:effectLst>
+              <a:outerShdw blurRad="50800" dist="38100" dir="5400000" algn="t" rotWithShape="0">
+                <a:prstClr val="black">
+                  <a:alpha val="40000"/>
+                </a:prstClr>
+              </a:outerShdw>
+            </a:effectLst>
+            <a:scene3d>
+              <a:camera prst="orthographicFront"/>
+              <a:lightRig rig="threePt" dir="t"/>
+            </a:scene3d>
+            <a:sp3d>
+              <a:bevelT/>
+            </a:sp3d>
+          </p:spPr>
+          <p:style>
+            <a:lnRef idx="2">
+              <a:schemeClr val="accent1">
+                <a:shade val="50000"/>
+              </a:schemeClr>
+            </a:lnRef>
+            <a:fillRef idx="1">
+              <a:schemeClr val="accent1"/>
+            </a:fillRef>
+            <a:effectRef idx="0">
+              <a:schemeClr val="accent1"/>
+            </a:effectRef>
+            <a:fontRef idx="minor">
+              <a:schemeClr val="lt1"/>
+            </a:fontRef>
+          </p:style>
+          <p:txBody>
+            <a:bodyPr rtlCol="0" anchor="ctr">
+              <a:normAutofit/>
+            </a:bodyPr>
+            <a:lstStyle/>
+            <a:p>
+              <a:pPr algn="ctr"/>
+              <a:r>
+                <a:rPr lang="en-US" sz="1400" dirty="0">
+                  <a:effectLst>
+                    <a:outerShdw blurRad="38100" dist="38100" dir="2700000" algn="tl">
+                      <a:srgbClr val="000000">
+                        <a:alpha val="43137"/>
+                      </a:srgbClr>
+                    </a:outerShdw>
+                  </a:effectLst>
+                </a:rPr>
+                <a:t>UCI MLR Notable Growth in Data Size</a:t>
+              </a:r>
+            </a:p>
+          </p:txBody>
+        </p:sp>
+      </p:grpSp>
+      <p:grpSp>
+        <p:nvGrpSpPr>
+          <p:cNvPr id="67" name="Group 66">
+            <a:extLst>
+              <a:ext uri="{FF2B5EF4-FFF2-40B4-BE49-F238E27FC236}">
+                <a16:creationId xmlns:a16="http://schemas.microsoft.com/office/drawing/2014/main" id="{9B618CBE-C437-4812-9A04-903E68DB3D39}"/>
+              </a:ext>
+            </a:extLst>
+          </p:cNvPr>
+          <p:cNvGrpSpPr/>
+          <p:nvPr/>
+        </p:nvGrpSpPr>
+        <p:grpSpPr>
+          <a:xfrm>
+            <a:off x="1108823" y="1001942"/>
+            <a:ext cx="9970011" cy="341913"/>
+            <a:chOff x="1140547" y="785125"/>
+            <a:chExt cx="9970011" cy="341913"/>
+          </a:xfrm>
+        </p:grpSpPr>
+        <p:sp>
+          <p:nvSpPr>
+            <p:cNvPr id="34" name="Rectangle: Rounded Corners 33">
+              <a:extLst>
+                <a:ext uri="{FF2B5EF4-FFF2-40B4-BE49-F238E27FC236}">
+                  <a16:creationId xmlns:a16="http://schemas.microsoft.com/office/drawing/2014/main" id="{7D9C3FFB-E3FC-4D62-8221-2D04CBD6A4B9}"/>
+                </a:ext>
+              </a:extLst>
+            </p:cNvPr>
+            <p:cNvSpPr/>
+            <p:nvPr/>
+          </p:nvSpPr>
+          <p:spPr>
+            <a:xfrm>
+              <a:off x="2819831" y="785125"/>
+              <a:ext cx="1573590" cy="341913"/>
+            </a:xfrm>
+            <a:prstGeom prst="roundRect">
+              <a:avLst/>
+            </a:prstGeom>
+            <a:effectLst>
+              <a:outerShdw blurRad="50800" dist="38100" dir="5400000" algn="t" rotWithShape="0">
+                <a:prstClr val="black">
+                  <a:alpha val="40000"/>
+                </a:prstClr>
+              </a:outerShdw>
+            </a:effectLst>
+            <a:scene3d>
+              <a:camera prst="orthographicFront"/>
+              <a:lightRig rig="threePt" dir="t"/>
+            </a:scene3d>
+            <a:sp3d>
+              <a:bevelT/>
+            </a:sp3d>
+          </p:spPr>
+          <p:style>
+            <a:lnRef idx="2">
+              <a:schemeClr val="accent3">
+                <a:shade val="50000"/>
+              </a:schemeClr>
+            </a:lnRef>
+            <a:fillRef idx="1">
+              <a:schemeClr val="accent3"/>
+            </a:fillRef>
+            <a:effectRef idx="0">
+              <a:schemeClr val="accent3"/>
+            </a:effectRef>
+            <a:fontRef idx="minor">
+              <a:schemeClr val="lt1"/>
+            </a:fontRef>
+          </p:style>
+          <p:txBody>
+            <a:bodyPr rtlCol="0" anchor="ctr">
+              <a:noAutofit/>
+            </a:bodyPr>
+            <a:lstStyle/>
+            <a:p>
+              <a:pPr algn="ctr"/>
+              <a:r>
+                <a:rPr lang="en-US" sz="1600" dirty="0">
+                  <a:effectLst>
+                    <a:outerShdw blurRad="38100" dist="38100" dir="2700000" algn="tl">
+                      <a:srgbClr val="000000">
+                        <a:alpha val="43137"/>
+                      </a:srgbClr>
+                    </a:outerShdw>
+                  </a:effectLst>
+                </a:rPr>
+                <a:t>1997:</a:t>
+              </a:r>
+            </a:p>
+          </p:txBody>
+        </p:sp>
+        <p:sp>
+          <p:nvSpPr>
+            <p:cNvPr id="38" name="Rectangle: Rounded Corners 37">
+              <a:extLst>
+                <a:ext uri="{FF2B5EF4-FFF2-40B4-BE49-F238E27FC236}">
+                  <a16:creationId xmlns:a16="http://schemas.microsoft.com/office/drawing/2014/main" id="{4D9060C3-045D-4238-86FC-87EFB97830B3}"/>
+                </a:ext>
+              </a:extLst>
+            </p:cNvPr>
+            <p:cNvSpPr/>
+            <p:nvPr/>
+          </p:nvSpPr>
+          <p:spPr>
+            <a:xfrm>
+              <a:off x="6178399" y="785125"/>
+              <a:ext cx="1573590" cy="341913"/>
+            </a:xfrm>
+            <a:prstGeom prst="roundRect">
+              <a:avLst/>
+            </a:prstGeom>
+            <a:effectLst>
+              <a:outerShdw blurRad="50800" dist="38100" dir="5400000" algn="t" rotWithShape="0">
+                <a:prstClr val="black">
+                  <a:alpha val="40000"/>
+                </a:prstClr>
+              </a:outerShdw>
+            </a:effectLst>
+            <a:scene3d>
+              <a:camera prst="orthographicFront"/>
+              <a:lightRig rig="threePt" dir="t"/>
+            </a:scene3d>
+            <a:sp3d>
+              <a:bevelT/>
+            </a:sp3d>
+          </p:spPr>
+          <p:style>
+            <a:lnRef idx="2">
+              <a:schemeClr val="accent3">
+                <a:shade val="50000"/>
+              </a:schemeClr>
+            </a:lnRef>
+            <a:fillRef idx="1">
+              <a:schemeClr val="accent3"/>
+            </a:fillRef>
+            <a:effectRef idx="0">
+              <a:schemeClr val="accent3"/>
+            </a:effectRef>
+            <a:fontRef idx="minor">
+              <a:schemeClr val="lt1"/>
+            </a:fontRef>
+          </p:style>
+          <p:txBody>
+            <a:bodyPr rtlCol="0" anchor="ctr">
+              <a:noAutofit/>
+            </a:bodyPr>
+            <a:lstStyle/>
+            <a:p>
+              <a:pPr algn="ctr"/>
+              <a:r>
+                <a:rPr lang="en-US" sz="1600" dirty="0">
+                  <a:effectLst>
+                    <a:outerShdw blurRad="38100" dist="38100" dir="2700000" algn="tl">
+                      <a:srgbClr val="000000">
+                        <a:alpha val="43137"/>
+                      </a:srgbClr>
+                    </a:outerShdw>
+                  </a:effectLst>
+                </a:rPr>
+                <a:t>2011:</a:t>
+              </a:r>
+            </a:p>
+          </p:txBody>
+        </p:sp>
+        <p:sp>
+          <p:nvSpPr>
+            <p:cNvPr id="52" name="Rectangle: Rounded Corners 51">
+              <a:extLst>
+                <a:ext uri="{FF2B5EF4-FFF2-40B4-BE49-F238E27FC236}">
+                  <a16:creationId xmlns:a16="http://schemas.microsoft.com/office/drawing/2014/main" id="{5EB67131-3F1E-4B65-A8A1-35E430EC6F4B}"/>
+                </a:ext>
+              </a:extLst>
+            </p:cNvPr>
+            <p:cNvSpPr/>
+            <p:nvPr/>
+          </p:nvSpPr>
+          <p:spPr>
+            <a:xfrm>
+              <a:off x="7857683" y="785125"/>
+              <a:ext cx="1573590" cy="341913"/>
+            </a:xfrm>
+            <a:prstGeom prst="roundRect">
+              <a:avLst/>
+            </a:prstGeom>
+            <a:effectLst>
+              <a:outerShdw blurRad="50800" dist="38100" dir="5400000" algn="t" rotWithShape="0">
+                <a:prstClr val="black">
+                  <a:alpha val="40000"/>
+                </a:prstClr>
+              </a:outerShdw>
+            </a:effectLst>
+            <a:scene3d>
+              <a:camera prst="orthographicFront"/>
+              <a:lightRig rig="threePt" dir="t"/>
+            </a:scene3d>
+            <a:sp3d>
+              <a:bevelT/>
+            </a:sp3d>
+          </p:spPr>
+          <p:style>
+            <a:lnRef idx="2">
+              <a:schemeClr val="accent3">
+                <a:shade val="50000"/>
+              </a:schemeClr>
+            </a:lnRef>
+            <a:fillRef idx="1">
+              <a:schemeClr val="accent3"/>
+            </a:fillRef>
+            <a:effectRef idx="0">
+              <a:schemeClr val="accent3"/>
+            </a:effectRef>
+            <a:fontRef idx="minor">
+              <a:schemeClr val="lt1"/>
+            </a:fontRef>
+          </p:style>
+          <p:txBody>
+            <a:bodyPr rtlCol="0" anchor="ctr">
+              <a:noAutofit/>
+            </a:bodyPr>
+            <a:lstStyle/>
+            <a:p>
+              <a:pPr algn="ctr"/>
+              <a:r>
+                <a:rPr lang="en-US" sz="1600" dirty="0">
+                  <a:effectLst>
+                    <a:outerShdw blurRad="38100" dist="38100" dir="2700000" algn="tl">
+                      <a:srgbClr val="000000">
+                        <a:alpha val="43137"/>
+                      </a:srgbClr>
+                    </a:outerShdw>
+                  </a:effectLst>
+                </a:rPr>
+                <a:t>2015:</a:t>
+              </a:r>
+            </a:p>
+          </p:txBody>
+        </p:sp>
+        <p:sp>
+          <p:nvSpPr>
+            <p:cNvPr id="5" name="Rectangle: Rounded Corners 4">
+              <a:extLst>
+                <a:ext uri="{FF2B5EF4-FFF2-40B4-BE49-F238E27FC236}">
+                  <a16:creationId xmlns:a16="http://schemas.microsoft.com/office/drawing/2014/main" id="{CA768D3D-6984-43DA-90A7-2B512F6AB456}"/>
+                </a:ext>
+              </a:extLst>
+            </p:cNvPr>
+            <p:cNvSpPr/>
+            <p:nvPr/>
+          </p:nvSpPr>
+          <p:spPr>
+            <a:xfrm>
+              <a:off x="1140547" y="785125"/>
+              <a:ext cx="1573590" cy="341913"/>
+            </a:xfrm>
+            <a:prstGeom prst="roundRect">
+              <a:avLst/>
+            </a:prstGeom>
+            <a:effectLst>
+              <a:outerShdw blurRad="50800" dist="38100" dir="5400000" algn="t" rotWithShape="0">
+                <a:prstClr val="black">
+                  <a:alpha val="40000"/>
+                </a:prstClr>
+              </a:outerShdw>
+            </a:effectLst>
+            <a:scene3d>
+              <a:camera prst="orthographicFront"/>
+              <a:lightRig rig="threePt" dir="t"/>
+            </a:scene3d>
+            <a:sp3d>
+              <a:bevelT/>
+            </a:sp3d>
+          </p:spPr>
+          <p:style>
+            <a:lnRef idx="2">
+              <a:schemeClr val="accent3">
+                <a:shade val="50000"/>
+              </a:schemeClr>
+            </a:lnRef>
+            <a:fillRef idx="1">
+              <a:schemeClr val="accent3"/>
+            </a:fillRef>
+            <a:effectRef idx="0">
+              <a:schemeClr val="accent3"/>
+            </a:effectRef>
+            <a:fontRef idx="minor">
+              <a:schemeClr val="lt1"/>
+            </a:fontRef>
+          </p:style>
+          <p:txBody>
+            <a:bodyPr rtlCol="0" anchor="ctr">
+              <a:noAutofit/>
+            </a:bodyPr>
+            <a:lstStyle/>
+            <a:p>
+              <a:pPr algn="ctr"/>
+              <a:r>
+                <a:rPr lang="en-US" sz="1600" dirty="0">
+                  <a:effectLst>
+                    <a:outerShdw blurRad="38100" dist="38100" dir="2700000" algn="tl">
+                      <a:srgbClr val="000000">
+                        <a:alpha val="43137"/>
+                      </a:srgbClr>
+                    </a:outerShdw>
+                  </a:effectLst>
+                </a:rPr>
+                <a:t>1987:</a:t>
+              </a:r>
+            </a:p>
+          </p:txBody>
+        </p:sp>
+        <p:sp>
+          <p:nvSpPr>
+            <p:cNvPr id="9" name="Rectangle: Rounded Corners 8">
+              <a:extLst>
+                <a:ext uri="{FF2B5EF4-FFF2-40B4-BE49-F238E27FC236}">
+                  <a16:creationId xmlns:a16="http://schemas.microsoft.com/office/drawing/2014/main" id="{203D116C-425D-48CC-BAE0-1B16C5B6840E}"/>
+                </a:ext>
+              </a:extLst>
+            </p:cNvPr>
+            <p:cNvSpPr/>
+            <p:nvPr/>
+          </p:nvSpPr>
+          <p:spPr>
+            <a:xfrm>
+              <a:off x="4499115" y="785125"/>
+              <a:ext cx="1573590" cy="341913"/>
+            </a:xfrm>
+            <a:prstGeom prst="roundRect">
+              <a:avLst/>
+            </a:prstGeom>
+            <a:effectLst>
+              <a:outerShdw blurRad="50800" dist="38100" dir="5400000" algn="t" rotWithShape="0">
+                <a:prstClr val="black">
+                  <a:alpha val="40000"/>
+                </a:prstClr>
+              </a:outerShdw>
+            </a:effectLst>
+            <a:scene3d>
+              <a:camera prst="orthographicFront"/>
+              <a:lightRig rig="threePt" dir="t"/>
+            </a:scene3d>
+            <a:sp3d>
+              <a:bevelT/>
+            </a:sp3d>
+          </p:spPr>
+          <p:style>
+            <a:lnRef idx="2">
+              <a:schemeClr val="accent3">
+                <a:shade val="50000"/>
+              </a:schemeClr>
+            </a:lnRef>
+            <a:fillRef idx="1">
+              <a:schemeClr val="accent3"/>
+            </a:fillRef>
+            <a:effectRef idx="0">
+              <a:schemeClr val="accent3"/>
+            </a:effectRef>
+            <a:fontRef idx="minor">
+              <a:schemeClr val="lt1"/>
+            </a:fontRef>
+          </p:style>
+          <p:txBody>
+            <a:bodyPr rtlCol="0" anchor="ctr">
+              <a:noAutofit/>
+            </a:bodyPr>
+            <a:lstStyle/>
+            <a:p>
+              <a:pPr algn="ctr"/>
+              <a:r>
+                <a:rPr lang="en-US" sz="1600" dirty="0">
+                  <a:effectLst>
+                    <a:outerShdw blurRad="38100" dist="38100" dir="2700000" algn="tl">
+                      <a:srgbClr val="000000">
+                        <a:alpha val="43137"/>
+                      </a:srgbClr>
+                    </a:outerShdw>
+                  </a:effectLst>
+                </a:rPr>
+                <a:t>2007:</a:t>
+              </a:r>
+            </a:p>
+          </p:txBody>
+        </p:sp>
+        <p:sp>
+          <p:nvSpPr>
+            <p:cNvPr id="13" name="Rectangle: Rounded Corners 12">
+              <a:extLst>
+                <a:ext uri="{FF2B5EF4-FFF2-40B4-BE49-F238E27FC236}">
+                  <a16:creationId xmlns:a16="http://schemas.microsoft.com/office/drawing/2014/main" id="{22FD88B2-108D-4BD1-A697-C0C45370890A}"/>
+                </a:ext>
+              </a:extLst>
+            </p:cNvPr>
+            <p:cNvSpPr/>
+            <p:nvPr/>
+          </p:nvSpPr>
+          <p:spPr>
+            <a:xfrm>
+              <a:off x="9536968" y="785125"/>
+              <a:ext cx="1573590" cy="341913"/>
+            </a:xfrm>
+            <a:prstGeom prst="roundRect">
+              <a:avLst/>
+            </a:prstGeom>
+            <a:effectLst>
+              <a:outerShdw blurRad="50800" dist="38100" dir="5400000" algn="t" rotWithShape="0">
+                <a:prstClr val="black">
+                  <a:alpha val="40000"/>
+                </a:prstClr>
+              </a:outerShdw>
+            </a:effectLst>
+            <a:scene3d>
+              <a:camera prst="orthographicFront"/>
+              <a:lightRig rig="threePt" dir="t"/>
+            </a:scene3d>
+            <a:sp3d>
+              <a:bevelT/>
+            </a:sp3d>
+          </p:spPr>
+          <p:style>
+            <a:lnRef idx="2">
+              <a:schemeClr val="accent3">
+                <a:shade val="50000"/>
+              </a:schemeClr>
+            </a:lnRef>
+            <a:fillRef idx="1">
+              <a:schemeClr val="accent3"/>
+            </a:fillRef>
+            <a:effectRef idx="0">
+              <a:schemeClr val="accent3"/>
+            </a:effectRef>
+            <a:fontRef idx="minor">
+              <a:schemeClr val="lt1"/>
+            </a:fontRef>
+          </p:style>
+          <p:txBody>
+            <a:bodyPr rtlCol="0" anchor="ctr">
+              <a:noAutofit/>
+            </a:bodyPr>
+            <a:lstStyle/>
+            <a:p>
+              <a:pPr algn="ctr"/>
+              <a:r>
+                <a:rPr lang="en-US" sz="1600" dirty="0">
+                  <a:effectLst>
+                    <a:outerShdw blurRad="38100" dist="38100" dir="2700000" algn="tl">
+                      <a:srgbClr val="000000">
+                        <a:alpha val="43137"/>
+                      </a:srgbClr>
+                    </a:outerShdw>
+                  </a:effectLst>
+                </a:rPr>
+                <a:t>2015:</a:t>
+              </a:r>
+            </a:p>
+          </p:txBody>
+        </p:sp>
+      </p:grpSp>
+      <p:grpSp>
+        <p:nvGrpSpPr>
+          <p:cNvPr id="70" name="Group 69">
+            <a:extLst>
+              <a:ext uri="{FF2B5EF4-FFF2-40B4-BE49-F238E27FC236}">
+                <a16:creationId xmlns:a16="http://schemas.microsoft.com/office/drawing/2014/main" id="{26125162-1145-4DC4-B670-23E79A42FA2D}"/>
+              </a:ext>
+            </a:extLst>
+          </p:cNvPr>
+          <p:cNvGrpSpPr/>
+          <p:nvPr/>
+        </p:nvGrpSpPr>
+        <p:grpSpPr>
+          <a:xfrm>
+            <a:off x="1647050" y="6221691"/>
+            <a:ext cx="8897901" cy="368089"/>
+            <a:chOff x="1546993" y="6221691"/>
+            <a:chExt cx="8897901" cy="368089"/>
+          </a:xfrm>
+        </p:grpSpPr>
+        <p:sp>
+          <p:nvSpPr>
+            <p:cNvPr id="27" name="Rectangle: Rounded Corners 26">
+              <a:extLst>
+                <a:ext uri="{FF2B5EF4-FFF2-40B4-BE49-F238E27FC236}">
+                  <a16:creationId xmlns:a16="http://schemas.microsoft.com/office/drawing/2014/main" id="{D6B435C2-3C7C-4006-8470-3A2BAAFC6C15}"/>
+                </a:ext>
+              </a:extLst>
+            </p:cNvPr>
+            <p:cNvSpPr/>
+            <p:nvPr/>
+          </p:nvSpPr>
+          <p:spPr>
+            <a:xfrm>
+              <a:off x="7561285" y="6221691"/>
+              <a:ext cx="2883609" cy="368089"/>
+            </a:xfrm>
+            <a:prstGeom prst="roundRect">
+              <a:avLst/>
+            </a:prstGeom>
+            <a:solidFill>
+              <a:srgbClr val="00B050"/>
+            </a:solidFill>
+            <a:effectLst>
+              <a:outerShdw blurRad="50800" dist="38100" dir="5400000" algn="t" rotWithShape="0">
+                <a:prstClr val="black">
+                  <a:alpha val="40000"/>
+                </a:prstClr>
+              </a:outerShdw>
+            </a:effectLst>
+            <a:scene3d>
+              <a:camera prst="orthographicFront"/>
+              <a:lightRig rig="threePt" dir="t"/>
+            </a:scene3d>
+            <a:sp3d>
+              <a:bevelT/>
+            </a:sp3d>
+          </p:spPr>
+          <p:style>
+            <a:lnRef idx="2">
+              <a:schemeClr val="accent1">
+                <a:shade val="50000"/>
+              </a:schemeClr>
+            </a:lnRef>
+            <a:fillRef idx="1">
+              <a:schemeClr val="accent1"/>
+            </a:fillRef>
+            <a:effectRef idx="0">
+              <a:schemeClr val="accent1"/>
+            </a:effectRef>
+            <a:fontRef idx="minor">
+              <a:schemeClr val="lt1"/>
+            </a:fontRef>
+          </p:style>
+          <p:txBody>
+            <a:bodyPr rtlCol="0" anchor="ctr">
+              <a:normAutofit/>
+            </a:bodyPr>
+            <a:lstStyle/>
+            <a:p>
+              <a:pPr algn="ctr"/>
+              <a:r>
+                <a:rPr lang="en-US" sz="1400" dirty="0">
+                  <a:effectLst>
+                    <a:outerShdw blurRad="38100" dist="38100" dir="2700000" algn="tl">
+                      <a:srgbClr val="000000">
+                        <a:alpha val="43137"/>
+                      </a:srgbClr>
+                    </a:outerShdw>
+                  </a:effectLst>
+                </a:rPr>
+                <a:t>Possible links to UCI MLR changes</a:t>
+              </a:r>
+            </a:p>
+          </p:txBody>
+        </p:sp>
+        <p:sp>
+          <p:nvSpPr>
+            <p:cNvPr id="64" name="Rectangle: Rounded Corners 63">
+              <a:extLst>
+                <a:ext uri="{FF2B5EF4-FFF2-40B4-BE49-F238E27FC236}">
+                  <a16:creationId xmlns:a16="http://schemas.microsoft.com/office/drawing/2014/main" id="{FB43BB68-4E5D-4D2A-B3A1-51DC38C49538}"/>
+                </a:ext>
+              </a:extLst>
+            </p:cNvPr>
+            <p:cNvSpPr/>
+            <p:nvPr/>
+          </p:nvSpPr>
+          <p:spPr>
+            <a:xfrm>
+              <a:off x="1546993" y="6221691"/>
+              <a:ext cx="2883609" cy="368089"/>
+            </a:xfrm>
+            <a:prstGeom prst="roundRect">
+              <a:avLst/>
+            </a:prstGeom>
+            <a:solidFill>
+              <a:srgbClr val="00B0F0"/>
+            </a:solidFill>
+            <a:effectLst>
+              <a:outerShdw blurRad="50800" dist="38100" dir="5400000" algn="t" rotWithShape="0">
+                <a:prstClr val="black">
+                  <a:alpha val="40000"/>
+                </a:prstClr>
+              </a:outerShdw>
+            </a:effectLst>
+            <a:scene3d>
+              <a:camera prst="orthographicFront"/>
+              <a:lightRig rig="threePt" dir="t"/>
+            </a:scene3d>
+            <a:sp3d>
+              <a:bevelT/>
+            </a:sp3d>
+          </p:spPr>
+          <p:style>
+            <a:lnRef idx="2">
+              <a:schemeClr val="accent1">
+                <a:shade val="50000"/>
+              </a:schemeClr>
+            </a:lnRef>
+            <a:fillRef idx="1">
+              <a:schemeClr val="accent1"/>
+            </a:fillRef>
+            <a:effectRef idx="0">
+              <a:schemeClr val="accent1"/>
+            </a:effectRef>
+            <a:fontRef idx="minor">
+              <a:schemeClr val="lt1"/>
+            </a:fontRef>
+          </p:style>
+          <p:txBody>
+            <a:bodyPr rtlCol="0" anchor="ctr">
+              <a:normAutofit/>
+            </a:bodyPr>
+            <a:lstStyle/>
+            <a:p>
+              <a:pPr algn="ctr"/>
+              <a:r>
+                <a:rPr lang="en-US" sz="1400" dirty="0">
+                  <a:effectLst>
+                    <a:outerShdw blurRad="38100" dist="38100" dir="2700000" algn="tl">
+                      <a:srgbClr val="000000">
+                        <a:alpha val="43137"/>
+                      </a:srgbClr>
+                    </a:outerShdw>
+                  </a:effectLst>
+                </a:rPr>
+                <a:t>UCI MLR Events</a:t>
+              </a:r>
+            </a:p>
+          </p:txBody>
+        </p:sp>
+        <p:sp>
+          <p:nvSpPr>
+            <p:cNvPr id="65" name="Rectangle: Rounded Corners 64">
+              <a:extLst>
+                <a:ext uri="{FF2B5EF4-FFF2-40B4-BE49-F238E27FC236}">
+                  <a16:creationId xmlns:a16="http://schemas.microsoft.com/office/drawing/2014/main" id="{028F5519-13D6-4697-B96C-901588B1A202}"/>
+                </a:ext>
+              </a:extLst>
+            </p:cNvPr>
+            <p:cNvSpPr/>
+            <p:nvPr/>
+          </p:nvSpPr>
+          <p:spPr>
+            <a:xfrm>
+              <a:off x="4554139" y="6221691"/>
+              <a:ext cx="2883609" cy="368089"/>
+            </a:xfrm>
+            <a:prstGeom prst="roundRect">
+              <a:avLst/>
+            </a:prstGeom>
+            <a:solidFill>
+              <a:schemeClr val="bg1">
+                <a:lumMod val="50000"/>
+                <a:lumOff val="50000"/>
+              </a:schemeClr>
+            </a:solidFill>
+            <a:effectLst>
+              <a:outerShdw blurRad="50800" dist="38100" dir="5400000" algn="t" rotWithShape="0">
+                <a:prstClr val="black">
+                  <a:alpha val="40000"/>
+                </a:prstClr>
+              </a:outerShdw>
+            </a:effectLst>
+            <a:scene3d>
+              <a:camera prst="orthographicFront"/>
+              <a:lightRig rig="threePt" dir="t"/>
+            </a:scene3d>
+            <a:sp3d>
+              <a:bevelT/>
+            </a:sp3d>
+          </p:spPr>
+          <p:style>
+            <a:lnRef idx="2">
+              <a:schemeClr val="accent1">
+                <a:shade val="50000"/>
+              </a:schemeClr>
+            </a:lnRef>
+            <a:fillRef idx="1">
+              <a:schemeClr val="accent1"/>
+            </a:fillRef>
+            <a:effectRef idx="0">
+              <a:schemeClr val="accent1"/>
+            </a:effectRef>
+            <a:fontRef idx="minor">
+              <a:schemeClr val="lt1"/>
+            </a:fontRef>
+          </p:style>
+          <p:txBody>
+            <a:bodyPr rtlCol="0" anchor="ctr">
+              <a:normAutofit/>
+            </a:bodyPr>
+            <a:lstStyle/>
+            <a:p>
+              <a:pPr algn="ctr"/>
+              <a:r>
+                <a:rPr lang="en-US" sz="1400" dirty="0">
+                  <a:effectLst>
+                    <a:outerShdw blurRad="38100" dist="38100" dir="2700000" algn="tl">
+                      <a:srgbClr val="000000">
+                        <a:alpha val="43137"/>
+                      </a:srgbClr>
+                    </a:outerShdw>
+                  </a:effectLst>
+                </a:rPr>
+                <a:t>Benchmarks in AI Development</a:t>
+              </a:r>
+            </a:p>
+          </p:txBody>
+        </p:sp>
+      </p:grpSp>
     </p:spTree>
     <p:extLst>
       <p:ext uri="{BB962C8B-B14F-4D97-AF65-F5344CB8AC3E}">

</xml_diff>